<commit_message>
adding pargrp to run in gui
</commit_message>
<xml_diff>
--- a/Artifacts/Presentation/Fastwatch.pptx
+++ b/Artifacts/Presentation/Fastwatch.pptx
@@ -113,6 +113,11 @@
       </a:defRPr>
     </a:lvl9pPr>
   </p:defaultTextStyle>
+  <p:extLst>
+    <p:ext uri="{EFAFB233-063F-42B5-8137-9DF3F51BA10A}">
+      <p15:sldGuideLst xmlns:p15="http://schemas.microsoft.com/office/powerpoint/2012/main"/>
+    </p:ext>
+  </p:extLst>
 </p:presentation>
 </file>
 
@@ -404,7 +409,7 @@
             <a:fld id="{08B9EBBA-996F-894A-B54A-D6246ED52CEA}" type="datetimeFigureOut">
               <a:rPr lang="en-US" dirty="0"/>
               <a:pPr/>
-              <a:t>5/1/2018</a:t>
+              <a:t>5/3/2018</a:t>
             </a:fld>
             <a:endParaRPr lang="en-US" dirty="0"/>
           </a:p>
@@ -719,7 +724,7 @@
             <a:fld id="{18C79C5D-2A6F-F04D-97DA-BEF2467B64E4}" type="datetimeFigureOut">
               <a:rPr lang="en-US" dirty="0"/>
               <a:pPr/>
-              <a:t>5/1/2018</a:t>
+              <a:t>5/3/2018</a:t>
             </a:fld>
             <a:endParaRPr lang="en-US" dirty="0"/>
           </a:p>
@@ -1204,7 +1209,7 @@
             <a:fld id="{8DFA1846-DA80-1C48-A609-854EA85C59AD}" type="datetimeFigureOut">
               <a:rPr lang="en-US" dirty="0"/>
               <a:pPr/>
-              <a:t>5/1/2018</a:t>
+              <a:t>5/3/2018</a:t>
             </a:fld>
             <a:endParaRPr lang="en-US" dirty="0"/>
           </a:p>
@@ -1570,7 +1575,7 @@
             <a:fld id="{FBF54567-0DE4-3F47-BF90-CB84690072F9}" type="datetimeFigureOut">
               <a:rPr lang="en-US" dirty="0"/>
               <a:pPr/>
-              <a:t>5/1/2018</a:t>
+              <a:t>5/3/2018</a:t>
             </a:fld>
             <a:endParaRPr lang="en-US" dirty="0"/>
           </a:p>
@@ -1840,7 +1845,7 @@
             <a:fld id="{C6C52C72-DE31-F449-A4ED-4C594FD91407}" type="datetimeFigureOut">
               <a:rPr lang="en-US" dirty="0"/>
               <a:pPr/>
-              <a:t>5/1/2018</a:t>
+              <a:t>5/3/2018</a:t>
             </a:fld>
             <a:endParaRPr lang="en-US" dirty="0"/>
           </a:p>
@@ -2122,7 +2127,7 @@
             <a:fld id="{ED62726E-379B-B349-9EED-81ED093FA806}" type="datetimeFigureOut">
               <a:rPr lang="en-US" dirty="0"/>
               <a:pPr/>
-              <a:t>5/1/2018</a:t>
+              <a:t>5/3/2018</a:t>
             </a:fld>
             <a:endParaRPr lang="en-US" dirty="0"/>
           </a:p>
@@ -2402,7 +2407,7 @@
             <a:fld id="{9B3A1323-8D79-1946-B0D7-40001CF92E9D}" type="datetimeFigureOut">
               <a:rPr lang="en-US" dirty="0"/>
               <a:pPr/>
-              <a:t>5/1/2018</a:t>
+              <a:t>5/3/2018</a:t>
             </a:fld>
             <a:endParaRPr lang="en-US" dirty="0"/>
           </a:p>
@@ -2742,7 +2747,7 @@
             <a:fld id="{8DFA1846-DA80-1C48-A609-854EA85C59AD}" type="datetimeFigureOut">
               <a:rPr lang="en-US" dirty="0"/>
               <a:pPr/>
-              <a:t>5/1/2018</a:t>
+              <a:t>5/3/2018</a:t>
             </a:fld>
             <a:endParaRPr lang="en-US" dirty="0"/>
           </a:p>
@@ -3078,7 +3083,7 @@
             <a:fld id="{57302355-E14B-8545-A8F8-0FE83CC9D524}" type="datetimeFigureOut">
               <a:rPr lang="en-US" dirty="0"/>
               <a:pPr/>
-              <a:t>5/1/2018</a:t>
+              <a:t>5/3/2018</a:t>
             </a:fld>
             <a:endParaRPr lang="en-US" dirty="0"/>
           </a:p>
@@ -3552,7 +3557,7 @@
             <a:fld id="{02640F58-564D-2B4F-AE67-E407BA4FCF45}" type="datetimeFigureOut">
               <a:rPr lang="en-US" dirty="0"/>
               <a:pPr/>
-              <a:t>5/1/2018</a:t>
+              <a:t>5/3/2018</a:t>
             </a:fld>
             <a:endParaRPr lang="en-US" dirty="0"/>
           </a:p>
@@ -3770,7 +3775,7 @@
             <a:fld id="{F13A34C8-038E-2045-AF43-DF7DBB8E0E9E}" type="datetimeFigureOut">
               <a:rPr lang="en-US" dirty="0"/>
               <a:pPr/>
-              <a:t>5/1/2018</a:t>
+              <a:t>5/3/2018</a:t>
             </a:fld>
             <a:endParaRPr lang="en-US" dirty="0"/>
           </a:p>
@@ -3862,7 +3867,7 @@
             <a:fld id="{8818C68F-D26B-8F47-958C-23B49CF8A634}" type="datetimeFigureOut">
               <a:rPr lang="en-US" dirty="0"/>
               <a:pPr/>
-              <a:t>5/1/2018</a:t>
+              <a:t>5/3/2018</a:t>
             </a:fld>
             <a:endParaRPr lang="en-US" dirty="0"/>
           </a:p>
@@ -4326,7 +4331,7 @@
             <a:fld id="{D0DF5E60-9974-AC48-9591-99C2BB44B7CF}" type="datetimeFigureOut">
               <a:rPr lang="en-US" dirty="0"/>
               <a:pPr/>
-              <a:t>5/1/2018</a:t>
+              <a:t>5/3/2018</a:t>
             </a:fld>
             <a:endParaRPr lang="en-US" dirty="0"/>
           </a:p>
@@ -4636,7 +4641,7 @@
             <a:fld id="{18C79C5D-2A6F-F04D-97DA-BEF2467B64E4}" type="datetimeFigureOut">
               <a:rPr lang="en-US" dirty="0"/>
               <a:pPr/>
-              <a:t>5/1/2018</a:t>
+              <a:t>5/3/2018</a:t>
             </a:fld>
             <a:endParaRPr lang="en-US" dirty="0"/>
           </a:p>
@@ -4903,7 +4908,7 @@
             <a:fld id="{09B482E8-6E0E-1B4F-B1FD-C69DB9E858D9}" type="datetimeFigureOut">
               <a:rPr lang="en-US" dirty="0"/>
               <a:pPr/>
-              <a:t>5/1/2018</a:t>
+              <a:t>5/3/2018</a:t>
             </a:fld>
             <a:endParaRPr lang="en-US" dirty="0"/>
           </a:p>
@@ -5426,6 +5431,14 @@
 <file path=ppt/slides/slide10.xml><?xml version="1.0" encoding="utf-8"?>
 <p:sld xmlns:a="http://schemas.openxmlformats.org/drawingml/2006/main" xmlns:r="http://schemas.openxmlformats.org/officeDocument/2006/relationships" xmlns:p="http://schemas.openxmlformats.org/presentationml/2006/main">
   <p:cSld>
+    <p:bg>
+      <p:bgPr>
+        <a:solidFill>
+          <a:schemeClr val="bg2"/>
+        </a:solidFill>
+        <a:effectLst/>
+      </p:bgPr>
+    </p:bg>
     <p:spTree>
       <p:nvGrpSpPr>
         <p:cNvPr id="1" name=""/>
@@ -5442,6 +5455,441 @@
       </p:grpSpPr>
       <p:sp>
         <p:nvSpPr>
+          <p:cNvPr id="9" name="Freeform 6">
+            <a:extLst>
+              <a:ext uri="{FF2B5EF4-FFF2-40B4-BE49-F238E27FC236}">
+                <a16:creationId xmlns:a16="http://schemas.microsoft.com/office/drawing/2014/main" id="{8775F366-526C-4C42-8931-696FFE8AA517}"/>
+              </a:ext>
+            </a:extLst>
+          </p:cNvPr>
+          <p:cNvSpPr>
+            <a:spLocks noGrp="1" noRot="1" noChangeAspect="1" noMove="1" noResize="1" noEditPoints="1" noAdjustHandles="1" noChangeArrowheads="1" noChangeShapeType="1" noTextEdit="1"/>
+          </p:cNvSpPr>
+          <p:nvPr>
+            <p:extLst>
+              <p:ext uri="{386F3935-93C4-4BCD-93E2-E3B085C9AB24}">
+                <p16:designElem xmlns:p16="http://schemas.microsoft.com/office/powerpoint/2015/main" val="1"/>
+              </p:ext>
+            </p:extLst>
+          </p:nvPr>
+        </p:nvSpPr>
+        <p:spPr bwMode="auto">
+          <a:xfrm>
+            <a:off x="0" y="-3175"/>
+            <a:ext cx="12192000" cy="5203825"/>
+          </a:xfrm>
+          <a:custGeom>
+            <a:avLst/>
+            <a:gdLst/>
+            <a:ahLst/>
+            <a:cxnLst/>
+            <a:rect l="0" t="0" r="r" b="b"/>
+            <a:pathLst>
+              <a:path w="5760" h="3278">
+                <a:moveTo>
+                  <a:pt x="5760" y="0"/>
+                </a:moveTo>
+                <a:lnTo>
+                  <a:pt x="0" y="0"/>
+                </a:lnTo>
+                <a:lnTo>
+                  <a:pt x="0" y="3090"/>
+                </a:lnTo>
+                <a:lnTo>
+                  <a:pt x="943" y="3090"/>
+                </a:lnTo>
+                <a:lnTo>
+                  <a:pt x="1123" y="3270"/>
+                </a:lnTo>
+                <a:lnTo>
+                  <a:pt x="1123" y="3270"/>
+                </a:lnTo>
+                <a:lnTo>
+                  <a:pt x="1127" y="3272"/>
+                </a:lnTo>
+                <a:lnTo>
+                  <a:pt x="1133" y="3275"/>
+                </a:lnTo>
+                <a:lnTo>
+                  <a:pt x="1139" y="3278"/>
+                </a:lnTo>
+                <a:lnTo>
+                  <a:pt x="1144" y="3278"/>
+                </a:lnTo>
+                <a:lnTo>
+                  <a:pt x="1150" y="3278"/>
+                </a:lnTo>
+                <a:lnTo>
+                  <a:pt x="1155" y="3275"/>
+                </a:lnTo>
+                <a:lnTo>
+                  <a:pt x="1161" y="3272"/>
+                </a:lnTo>
+                <a:lnTo>
+                  <a:pt x="1165" y="3270"/>
+                </a:lnTo>
+                <a:lnTo>
+                  <a:pt x="1345" y="3090"/>
+                </a:lnTo>
+                <a:lnTo>
+                  <a:pt x="5760" y="3090"/>
+                </a:lnTo>
+                <a:lnTo>
+                  <a:pt x="5760" y="0"/>
+                </a:lnTo>
+                <a:close/>
+              </a:path>
+            </a:pathLst>
+          </a:custGeom>
+          <a:ln/>
+          <a:effectLst/>
+          <a:extLst>
+            <a:ext uri="{91240B29-F687-4f45-9708-019B960494DF}">
+              <a14:hiddenLine xmlns="" xmlns:a14="http://schemas.microsoft.com/office/drawing/2010/main" w="9525">
+                <a:solidFill>
+                  <a:srgbClr val="000000"/>
+                </a:solidFill>
+                <a:round/>
+                <a:headEnd/>
+                <a:tailEnd/>
+              </a14:hiddenLine>
+            </a:ext>
+          </a:extLst>
+        </p:spPr>
+        <p:style>
+          <a:lnRef idx="1">
+            <a:schemeClr val="accent1"/>
+          </a:lnRef>
+          <a:fillRef idx="3">
+            <a:schemeClr val="accent1"/>
+          </a:fillRef>
+          <a:effectRef idx="2">
+            <a:schemeClr val="accent1"/>
+          </a:effectRef>
+          <a:fontRef idx="minor">
+            <a:schemeClr val="lt1"/>
+          </a:fontRef>
+        </p:style>
+      </p:sp>
+      <p:sp useBgFill="1">
+        <p:nvSpPr>
+          <p:cNvPr id="11" name="Rectangle 10">
+            <a:extLst>
+              <a:ext uri="{FF2B5EF4-FFF2-40B4-BE49-F238E27FC236}">
+                <a16:creationId xmlns:a16="http://schemas.microsoft.com/office/drawing/2014/main" id="{21DCC7BA-3740-47E1-91B9-6269381397AE}"/>
+              </a:ext>
+            </a:extLst>
+          </p:cNvPr>
+          <p:cNvSpPr>
+            <a:spLocks noGrp="1" noRot="1" noChangeAspect="1" noMove="1" noResize="1" noEditPoints="1" noAdjustHandles="1" noChangeArrowheads="1" noChangeShapeType="1" noTextEdit="1"/>
+          </p:cNvSpPr>
+          <p:nvPr>
+            <p:extLst>
+              <p:ext uri="{386F3935-93C4-4BCD-93E2-E3B085C9AB24}">
+                <p16:designElem xmlns:p16="http://schemas.microsoft.com/office/powerpoint/2015/main" val="1"/>
+              </p:ext>
+            </p:extLst>
+          </p:nvPr>
+        </p:nvSpPr>
+        <p:spPr>
+          <a:xfrm>
+            <a:off x="0" y="0"/>
+            <a:ext cx="12192000" cy="6858000"/>
+          </a:xfrm>
+          <a:prstGeom prst="rect">
+            <a:avLst/>
+          </a:prstGeom>
+          <a:ln>
+            <a:noFill/>
+          </a:ln>
+        </p:spPr>
+        <p:style>
+          <a:lnRef idx="2">
+            <a:schemeClr val="accent1">
+              <a:shade val="50000"/>
+            </a:schemeClr>
+          </a:lnRef>
+          <a:fillRef idx="1">
+            <a:schemeClr val="accent1"/>
+          </a:fillRef>
+          <a:effectRef idx="0">
+            <a:schemeClr val="accent1"/>
+          </a:effectRef>
+          <a:fontRef idx="minor">
+            <a:schemeClr val="lt1"/>
+          </a:fontRef>
+        </p:style>
+        <p:txBody>
+          <a:bodyPr rtlCol="0" anchor="ctr"/>
+          <a:lstStyle/>
+          <a:p>
+            <a:pPr algn="ctr"/>
+            <a:endParaRPr lang="en-US"/>
+          </a:p>
+        </p:txBody>
+      </p:sp>
+      <p:sp>
+        <p:nvSpPr>
+          <p:cNvPr id="13" name="Freeform: Shape 12">
+            <a:extLst>
+              <a:ext uri="{FF2B5EF4-FFF2-40B4-BE49-F238E27FC236}">
+                <a16:creationId xmlns:a16="http://schemas.microsoft.com/office/drawing/2014/main" id="{84CEFA49-6B2F-4FE6-B6AF-31D49E68C23B}"/>
+              </a:ext>
+            </a:extLst>
+          </p:cNvPr>
+          <p:cNvSpPr>
+            <a:spLocks noGrp="1" noRot="1" noChangeAspect="1" noMove="1" noResize="1" noEditPoints="1" noAdjustHandles="1" noChangeArrowheads="1" noChangeShapeType="1" noTextEdit="1"/>
+          </p:cNvSpPr>
+          <p:nvPr>
+            <p:extLst>
+              <p:ext uri="{386F3935-93C4-4BCD-93E2-E3B085C9AB24}">
+                <p16:designElem xmlns:p16="http://schemas.microsoft.com/office/powerpoint/2015/main" val="1"/>
+              </p:ext>
+            </p:extLst>
+          </p:nvPr>
+        </p:nvSpPr>
+        <p:spPr bwMode="auto">
+          <a:xfrm rot="16200000">
+            <a:off x="-40086" y="40084"/>
+            <a:ext cx="6858002" cy="6777832"/>
+          </a:xfrm>
+          <a:custGeom>
+            <a:avLst/>
+            <a:gdLst>
+              <a:gd name="connsiteX0" fmla="*/ 6858001 w 6858002"/>
+              <a:gd name="connsiteY0" fmla="*/ 4666984 h 6777832"/>
+              <a:gd name="connsiteX1" fmla="*/ 3829243 w 6858002"/>
+              <a:gd name="connsiteY1" fmla="*/ 6654602 h 6777832"/>
+              <a:gd name="connsiteX2" fmla="*/ 3827370 w 6858002"/>
+              <a:gd name="connsiteY2" fmla="*/ 6656146 h 6777832"/>
+              <a:gd name="connsiteX3" fmla="*/ 3824584 w 6858002"/>
+              <a:gd name="connsiteY3" fmla="*/ 6657658 h 6777832"/>
+              <a:gd name="connsiteX4" fmla="*/ 3798694 w 6858002"/>
+              <a:gd name="connsiteY4" fmla="*/ 6674649 h 6777832"/>
+              <a:gd name="connsiteX5" fmla="*/ 3785012 w 6858002"/>
+              <a:gd name="connsiteY5" fmla="*/ 6679138 h 6777832"/>
+              <a:gd name="connsiteX6" fmla="*/ 3706340 w 6858002"/>
+              <a:gd name="connsiteY6" fmla="*/ 6721839 h 6777832"/>
+              <a:gd name="connsiteX7" fmla="*/ 3428999 w 6858002"/>
+              <a:gd name="connsiteY7" fmla="*/ 6777832 h 6777832"/>
+              <a:gd name="connsiteX8" fmla="*/ 3151659 w 6858002"/>
+              <a:gd name="connsiteY8" fmla="*/ 6721839 h 6777832"/>
+              <a:gd name="connsiteX9" fmla="*/ 3072997 w 6858002"/>
+              <a:gd name="connsiteY9" fmla="*/ 6679143 h 6777832"/>
+              <a:gd name="connsiteX10" fmla="*/ 3059299 w 6858002"/>
+              <a:gd name="connsiteY10" fmla="*/ 6674649 h 6777832"/>
+              <a:gd name="connsiteX11" fmla="*/ 3033384 w 6858002"/>
+              <a:gd name="connsiteY11" fmla="*/ 6657642 h 6777832"/>
+              <a:gd name="connsiteX12" fmla="*/ 3030628 w 6858002"/>
+              <a:gd name="connsiteY12" fmla="*/ 6656146 h 6777832"/>
+              <a:gd name="connsiteX13" fmla="*/ 3028776 w 6858002"/>
+              <a:gd name="connsiteY13" fmla="*/ 6654618 h 6777832"/>
+              <a:gd name="connsiteX14" fmla="*/ 1 w 6858002"/>
+              <a:gd name="connsiteY14" fmla="*/ 4666984 h 6777832"/>
+              <a:gd name="connsiteX15" fmla="*/ 6858002 w 6858002"/>
+              <a:gd name="connsiteY15" fmla="*/ 0 h 6777832"/>
+              <a:gd name="connsiteX16" fmla="*/ 6858002 w 6858002"/>
+              <a:gd name="connsiteY16" fmla="*/ 1570616 h 6777832"/>
+              <a:gd name="connsiteX17" fmla="*/ 6858001 w 6858002"/>
+              <a:gd name="connsiteY17" fmla="*/ 1570616 h 6777832"/>
+              <a:gd name="connsiteX18" fmla="*/ 6858001 w 6858002"/>
+              <a:gd name="connsiteY18" fmla="*/ 4666983 h 6777832"/>
+              <a:gd name="connsiteX19" fmla="*/ 0 w 6858002"/>
+              <a:gd name="connsiteY19" fmla="*/ 4666983 h 6777832"/>
+              <a:gd name="connsiteX20" fmla="*/ 0 w 6858002"/>
+              <a:gd name="connsiteY20" fmla="*/ 595217 h 6777832"/>
+              <a:gd name="connsiteX21" fmla="*/ 1 w 6858002"/>
+              <a:gd name="connsiteY21" fmla="*/ 595217 h 6777832"/>
+              <a:gd name="connsiteX22" fmla="*/ 1 w 6858002"/>
+              <a:gd name="connsiteY22" fmla="*/ 0 h 6777832"/>
+            </a:gdLst>
+            <a:ahLst/>
+            <a:cxnLst>
+              <a:cxn ang="0">
+                <a:pos x="connsiteX0" y="connsiteY0"/>
+              </a:cxn>
+              <a:cxn ang="0">
+                <a:pos x="connsiteX1" y="connsiteY1"/>
+              </a:cxn>
+              <a:cxn ang="0">
+                <a:pos x="connsiteX2" y="connsiteY2"/>
+              </a:cxn>
+              <a:cxn ang="0">
+                <a:pos x="connsiteX3" y="connsiteY3"/>
+              </a:cxn>
+              <a:cxn ang="0">
+                <a:pos x="connsiteX4" y="connsiteY4"/>
+              </a:cxn>
+              <a:cxn ang="0">
+                <a:pos x="connsiteX5" y="connsiteY5"/>
+              </a:cxn>
+              <a:cxn ang="0">
+                <a:pos x="connsiteX6" y="connsiteY6"/>
+              </a:cxn>
+              <a:cxn ang="0">
+                <a:pos x="connsiteX7" y="connsiteY7"/>
+              </a:cxn>
+              <a:cxn ang="0">
+                <a:pos x="connsiteX8" y="connsiteY8"/>
+              </a:cxn>
+              <a:cxn ang="0">
+                <a:pos x="connsiteX9" y="connsiteY9"/>
+              </a:cxn>
+              <a:cxn ang="0">
+                <a:pos x="connsiteX10" y="connsiteY10"/>
+              </a:cxn>
+              <a:cxn ang="0">
+                <a:pos x="connsiteX11" y="connsiteY11"/>
+              </a:cxn>
+              <a:cxn ang="0">
+                <a:pos x="connsiteX12" y="connsiteY12"/>
+              </a:cxn>
+              <a:cxn ang="0">
+                <a:pos x="connsiteX13" y="connsiteY13"/>
+              </a:cxn>
+              <a:cxn ang="0">
+                <a:pos x="connsiteX14" y="connsiteY14"/>
+              </a:cxn>
+              <a:cxn ang="0">
+                <a:pos x="connsiteX15" y="connsiteY15"/>
+              </a:cxn>
+              <a:cxn ang="0">
+                <a:pos x="connsiteX16" y="connsiteY16"/>
+              </a:cxn>
+              <a:cxn ang="0">
+                <a:pos x="connsiteX17" y="connsiteY17"/>
+              </a:cxn>
+              <a:cxn ang="0">
+                <a:pos x="connsiteX18" y="connsiteY18"/>
+              </a:cxn>
+              <a:cxn ang="0">
+                <a:pos x="connsiteX19" y="connsiteY19"/>
+              </a:cxn>
+              <a:cxn ang="0">
+                <a:pos x="connsiteX20" y="connsiteY20"/>
+              </a:cxn>
+              <a:cxn ang="0">
+                <a:pos x="connsiteX21" y="connsiteY21"/>
+              </a:cxn>
+              <a:cxn ang="0">
+                <a:pos x="connsiteX22" y="connsiteY22"/>
+              </a:cxn>
+            </a:cxnLst>
+            <a:rect l="l" t="t" r="r" b="b"/>
+            <a:pathLst>
+              <a:path w="6858002" h="6777832">
+                <a:moveTo>
+                  <a:pt x="6858001" y="4666984"/>
+                </a:moveTo>
+                <a:lnTo>
+                  <a:pt x="3829243" y="6654602"/>
+                </a:lnTo>
+                <a:lnTo>
+                  <a:pt x="3827370" y="6656146"/>
+                </a:lnTo>
+                <a:lnTo>
+                  <a:pt x="3824584" y="6657658"/>
+                </a:lnTo>
+                <a:lnTo>
+                  <a:pt x="3798694" y="6674649"/>
+                </a:lnTo>
+                <a:lnTo>
+                  <a:pt x="3785012" y="6679138"/>
+                </a:lnTo>
+                <a:lnTo>
+                  <a:pt x="3706340" y="6721839"/>
+                </a:lnTo>
+                <a:cubicBezTo>
+                  <a:pt x="3621097" y="6757894"/>
+                  <a:pt x="3527376" y="6777832"/>
+                  <a:pt x="3428999" y="6777832"/>
+                </a:cubicBezTo>
+                <a:cubicBezTo>
+                  <a:pt x="3330622" y="6777832"/>
+                  <a:pt x="3236902" y="6757894"/>
+                  <a:pt x="3151659" y="6721839"/>
+                </a:cubicBezTo>
+                <a:lnTo>
+                  <a:pt x="3072997" y="6679143"/>
+                </a:lnTo>
+                <a:lnTo>
+                  <a:pt x="3059299" y="6674649"/>
+                </a:lnTo>
+                <a:lnTo>
+                  <a:pt x="3033384" y="6657642"/>
+                </a:lnTo>
+                <a:lnTo>
+                  <a:pt x="3030628" y="6656146"/>
+                </a:lnTo>
+                <a:lnTo>
+                  <a:pt x="3028776" y="6654618"/>
+                </a:lnTo>
+                <a:lnTo>
+                  <a:pt x="1" y="4666984"/>
+                </a:lnTo>
+                <a:close/>
+                <a:moveTo>
+                  <a:pt x="6858002" y="0"/>
+                </a:moveTo>
+                <a:lnTo>
+                  <a:pt x="6858002" y="1570616"/>
+                </a:lnTo>
+                <a:lnTo>
+                  <a:pt x="6858001" y="1570616"/>
+                </a:lnTo>
+                <a:lnTo>
+                  <a:pt x="6858001" y="4666983"/>
+                </a:lnTo>
+                <a:lnTo>
+                  <a:pt x="0" y="4666983"/>
+                </a:lnTo>
+                <a:lnTo>
+                  <a:pt x="0" y="595217"/>
+                </a:lnTo>
+                <a:lnTo>
+                  <a:pt x="1" y="595217"/>
+                </a:lnTo>
+                <a:lnTo>
+                  <a:pt x="1" y="0"/>
+                </a:lnTo>
+                <a:close/>
+              </a:path>
+            </a:pathLst>
+          </a:custGeom>
+          <a:ln>
+            <a:noFill/>
+          </a:ln>
+          <a:effectLst/>
+          <a:extLst>
+            <a:ext uri="{91240B29-F687-4f45-9708-019B960494DF}">
+              <a14:hiddenLine xmlns="" xmlns:a16="http://schemas.microsoft.com/office/drawing/2014/main" xmlns:p14="http://schemas.microsoft.com/office/powerpoint/2010/main" xmlns:a14="http://schemas.microsoft.com/office/drawing/2010/main" w="9525">
+                <a:solidFill>
+                  <a:srgbClr val="000000"/>
+                </a:solidFill>
+                <a:round/>
+                <a:headEnd/>
+                <a:tailEnd/>
+              </a14:hiddenLine>
+            </a:ext>
+          </a:extLst>
+        </p:spPr>
+        <p:style>
+          <a:lnRef idx="1">
+            <a:schemeClr val="accent1"/>
+          </a:lnRef>
+          <a:fillRef idx="3">
+            <a:schemeClr val="accent1"/>
+          </a:fillRef>
+          <a:effectRef idx="2">
+            <a:schemeClr val="accent1"/>
+          </a:effectRef>
+          <a:fontRef idx="minor">
+            <a:schemeClr val="lt1"/>
+          </a:fontRef>
+        </p:style>
+      </p:sp>
+      <p:sp>
+        <p:nvSpPr>
           <p:cNvPr id="2" name="Title 1">
             <a:extLst>
               <a:ext uri="{FF2B5EF4-FFF2-40B4-BE49-F238E27FC236}">
@@ -5456,13 +5904,21 @@
             <p:ph type="title"/>
           </p:nvPr>
         </p:nvSpPr>
-        <p:spPr/>
-        <p:txBody>
-          <a:bodyPr/>
-          <a:lstStyle/>
-          <a:p>
-            <a:r>
-              <a:rPr lang="en-US" dirty="0"/>
+        <p:spPr>
+          <a:xfrm>
+            <a:off x="451514" y="947607"/>
+            <a:ext cx="4389427" cy="4962786"/>
+          </a:xfrm>
+        </p:spPr>
+        <p:txBody>
+          <a:bodyPr vert="horz" lIns="91440" tIns="45720" rIns="91440" bIns="45720" rtlCol="0" anchor="ctr">
+            <a:normAutofit/>
+          </a:bodyPr>
+          <a:lstStyle/>
+          <a:p>
+            <a:pPr algn="l"/>
+            <a:r>
+              <a:rPr lang="en-US" sz="5400"/>
               <a:t>Code</a:t>
             </a:r>
           </a:p>
@@ -5484,14 +5940,23 @@
             <p:ph type="body" idx="1"/>
           </p:nvPr>
         </p:nvSpPr>
-        <p:spPr/>
-        <p:txBody>
-          <a:bodyPr/>
-          <a:lstStyle/>
-          <a:p>
-            <a:r>
-              <a:rPr lang="en-US" dirty="0"/>
-              <a:t>Demonstration</a:t>
+        <p:spPr>
+          <a:xfrm>
+            <a:off x="7229345" y="947607"/>
+            <a:ext cx="4152655" cy="4962785"/>
+          </a:xfrm>
+          <a:effectLst/>
+        </p:spPr>
+        <p:txBody>
+          <a:bodyPr vert="horz" lIns="91440" tIns="45720" rIns="91440" bIns="45720" rtlCol="0" anchor="ctr">
+            <a:normAutofit/>
+          </a:bodyPr>
+          <a:lstStyle/>
+          <a:p>
+            <a:pPr algn="l"/>
+            <a:r>
+              <a:rPr lang="en-US" sz="2800" dirty="0"/>
+              <a:t>Live Demonstration</a:t>
             </a:r>
           </a:p>
         </p:txBody>
@@ -5598,6 +6063,14 @@
 <file path=ppt/slides/slide3.xml><?xml version="1.0" encoding="utf-8"?>
 <p:sld xmlns:a="http://schemas.openxmlformats.org/drawingml/2006/main" xmlns:r="http://schemas.openxmlformats.org/officeDocument/2006/relationships" xmlns:p="http://schemas.openxmlformats.org/presentationml/2006/main">
   <p:cSld>
+    <p:bg>
+      <p:bgPr>
+        <a:solidFill>
+          <a:schemeClr val="bg2"/>
+        </a:solidFill>
+        <a:effectLst/>
+      </p:bgPr>
+    </p:bg>
     <p:spTree>
       <p:nvGrpSpPr>
         <p:cNvPr id="1" name=""/>
@@ -5612,6 +6085,299 @@
           <a:chExt cx="0" cy="0"/>
         </a:xfrm>
       </p:grpSpPr>
+      <p:sp useBgFill="1">
+        <p:nvSpPr>
+          <p:cNvPr id="8" name="Rectangle 7">
+            <a:extLst>
+              <a:ext uri="{FF2B5EF4-FFF2-40B4-BE49-F238E27FC236}">
+                <a16:creationId xmlns:a16="http://schemas.microsoft.com/office/drawing/2014/main" id="{089A69AF-D57B-49B4-886C-D4A5DC194421}"/>
+              </a:ext>
+            </a:extLst>
+          </p:cNvPr>
+          <p:cNvSpPr>
+            <a:spLocks noGrp="1" noRot="1" noChangeAspect="1" noMove="1" noResize="1" noEditPoints="1" noAdjustHandles="1" noChangeArrowheads="1" noChangeShapeType="1" noTextEdit="1"/>
+          </p:cNvSpPr>
+          <p:nvPr>
+            <p:extLst>
+              <p:ext uri="{386F3935-93C4-4BCD-93E2-E3B085C9AB24}">
+                <p16:designElem xmlns:p16="http://schemas.microsoft.com/office/powerpoint/2015/main" val="1"/>
+              </p:ext>
+            </p:extLst>
+          </p:nvPr>
+        </p:nvSpPr>
+        <p:spPr>
+          <a:xfrm>
+            <a:off x="0" y="0"/>
+            <a:ext cx="12192000" cy="6858000"/>
+          </a:xfrm>
+          <a:prstGeom prst="rect">
+            <a:avLst/>
+          </a:prstGeom>
+          <a:ln>
+            <a:noFill/>
+          </a:ln>
+        </p:spPr>
+        <p:style>
+          <a:lnRef idx="2">
+            <a:schemeClr val="accent1">
+              <a:shade val="50000"/>
+            </a:schemeClr>
+          </a:lnRef>
+          <a:fillRef idx="1">
+            <a:schemeClr val="accent1"/>
+          </a:fillRef>
+          <a:effectRef idx="0">
+            <a:schemeClr val="accent1"/>
+          </a:effectRef>
+          <a:fontRef idx="minor">
+            <a:schemeClr val="lt1"/>
+          </a:fontRef>
+        </p:style>
+        <p:txBody>
+          <a:bodyPr rtlCol="0" anchor="ctr"/>
+          <a:lstStyle/>
+          <a:p>
+            <a:pPr algn="ctr"/>
+            <a:endParaRPr lang="en-US"/>
+          </a:p>
+        </p:txBody>
+      </p:sp>
+      <p:sp>
+        <p:nvSpPr>
+          <p:cNvPr id="10" name="Freeform: Shape 9">
+            <a:extLst>
+              <a:ext uri="{FF2B5EF4-FFF2-40B4-BE49-F238E27FC236}">
+                <a16:creationId xmlns:a16="http://schemas.microsoft.com/office/drawing/2014/main" id="{CABDC08D-6093-4397-92D4-54D00E2BB1C2}"/>
+              </a:ext>
+            </a:extLst>
+          </p:cNvPr>
+          <p:cNvSpPr>
+            <a:spLocks noGrp="1" noRot="1" noChangeAspect="1" noMove="1" noResize="1" noEditPoints="1" noAdjustHandles="1" noChangeArrowheads="1" noChangeShapeType="1" noTextEdit="1"/>
+          </p:cNvSpPr>
+          <p:nvPr>
+            <p:extLst>
+              <p:ext uri="{386F3935-93C4-4BCD-93E2-E3B085C9AB24}">
+                <p16:designElem xmlns:p16="http://schemas.microsoft.com/office/powerpoint/2015/main" val="1"/>
+              </p:ext>
+            </p:extLst>
+          </p:nvPr>
+        </p:nvSpPr>
+        <p:spPr bwMode="auto">
+          <a:xfrm rot="16200000">
+            <a:off x="-650724" y="650724"/>
+            <a:ext cx="6858000" cy="5556552"/>
+          </a:xfrm>
+          <a:custGeom>
+            <a:avLst/>
+            <a:gdLst>
+              <a:gd name="connsiteX0" fmla="*/ 6858000 w 6858000"/>
+              <a:gd name="connsiteY0" fmla="*/ 3445704 h 5556552"/>
+              <a:gd name="connsiteX1" fmla="*/ 3829242 w 6858000"/>
+              <a:gd name="connsiteY1" fmla="*/ 5433322 h 5556552"/>
+              <a:gd name="connsiteX2" fmla="*/ 3827369 w 6858000"/>
+              <a:gd name="connsiteY2" fmla="*/ 5434867 h 5556552"/>
+              <a:gd name="connsiteX3" fmla="*/ 3824583 w 6858000"/>
+              <a:gd name="connsiteY3" fmla="*/ 5436378 h 5556552"/>
+              <a:gd name="connsiteX4" fmla="*/ 3798693 w 6858000"/>
+              <a:gd name="connsiteY4" fmla="*/ 5453370 h 5556552"/>
+              <a:gd name="connsiteX5" fmla="*/ 3785011 w 6858000"/>
+              <a:gd name="connsiteY5" fmla="*/ 5457858 h 5556552"/>
+              <a:gd name="connsiteX6" fmla="*/ 3706339 w 6858000"/>
+              <a:gd name="connsiteY6" fmla="*/ 5500559 h 5556552"/>
+              <a:gd name="connsiteX7" fmla="*/ 3428998 w 6858000"/>
+              <a:gd name="connsiteY7" fmla="*/ 5556552 h 5556552"/>
+              <a:gd name="connsiteX8" fmla="*/ 3151658 w 6858000"/>
+              <a:gd name="connsiteY8" fmla="*/ 5500559 h 5556552"/>
+              <a:gd name="connsiteX9" fmla="*/ 3072996 w 6858000"/>
+              <a:gd name="connsiteY9" fmla="*/ 5457863 h 5556552"/>
+              <a:gd name="connsiteX10" fmla="*/ 3059298 w 6858000"/>
+              <a:gd name="connsiteY10" fmla="*/ 5453370 h 5556552"/>
+              <a:gd name="connsiteX11" fmla="*/ 3033383 w 6858000"/>
+              <a:gd name="connsiteY11" fmla="*/ 5436362 h 5556552"/>
+              <a:gd name="connsiteX12" fmla="*/ 3030627 w 6858000"/>
+              <a:gd name="connsiteY12" fmla="*/ 5434867 h 5556552"/>
+              <a:gd name="connsiteX13" fmla="*/ 3028775 w 6858000"/>
+              <a:gd name="connsiteY13" fmla="*/ 5433338 h 5556552"/>
+              <a:gd name="connsiteX14" fmla="*/ 0 w 6858000"/>
+              <a:gd name="connsiteY14" fmla="*/ 3445704 h 5556552"/>
+              <a:gd name="connsiteX15" fmla="*/ 6858000 w 6858000"/>
+              <a:gd name="connsiteY15" fmla="*/ 0 h 5556552"/>
+              <a:gd name="connsiteX16" fmla="*/ 6858000 w 6858000"/>
+              <a:gd name="connsiteY16" fmla="*/ 349336 h 5556552"/>
+              <a:gd name="connsiteX17" fmla="*/ 6858000 w 6858000"/>
+              <a:gd name="connsiteY17" fmla="*/ 3445703 h 5556552"/>
+              <a:gd name="connsiteX18" fmla="*/ 0 w 6858000"/>
+              <a:gd name="connsiteY18" fmla="*/ 3445703 h 5556552"/>
+              <a:gd name="connsiteX19" fmla="*/ 0 w 6858000"/>
+              <a:gd name="connsiteY19" fmla="*/ 0 h 5556552"/>
+            </a:gdLst>
+            <a:ahLst/>
+            <a:cxnLst>
+              <a:cxn ang="0">
+                <a:pos x="connsiteX0" y="connsiteY0"/>
+              </a:cxn>
+              <a:cxn ang="0">
+                <a:pos x="connsiteX1" y="connsiteY1"/>
+              </a:cxn>
+              <a:cxn ang="0">
+                <a:pos x="connsiteX2" y="connsiteY2"/>
+              </a:cxn>
+              <a:cxn ang="0">
+                <a:pos x="connsiteX3" y="connsiteY3"/>
+              </a:cxn>
+              <a:cxn ang="0">
+                <a:pos x="connsiteX4" y="connsiteY4"/>
+              </a:cxn>
+              <a:cxn ang="0">
+                <a:pos x="connsiteX5" y="connsiteY5"/>
+              </a:cxn>
+              <a:cxn ang="0">
+                <a:pos x="connsiteX6" y="connsiteY6"/>
+              </a:cxn>
+              <a:cxn ang="0">
+                <a:pos x="connsiteX7" y="connsiteY7"/>
+              </a:cxn>
+              <a:cxn ang="0">
+                <a:pos x="connsiteX8" y="connsiteY8"/>
+              </a:cxn>
+              <a:cxn ang="0">
+                <a:pos x="connsiteX9" y="connsiteY9"/>
+              </a:cxn>
+              <a:cxn ang="0">
+                <a:pos x="connsiteX10" y="connsiteY10"/>
+              </a:cxn>
+              <a:cxn ang="0">
+                <a:pos x="connsiteX11" y="connsiteY11"/>
+              </a:cxn>
+              <a:cxn ang="0">
+                <a:pos x="connsiteX12" y="connsiteY12"/>
+              </a:cxn>
+              <a:cxn ang="0">
+                <a:pos x="connsiteX13" y="connsiteY13"/>
+              </a:cxn>
+              <a:cxn ang="0">
+                <a:pos x="connsiteX14" y="connsiteY14"/>
+              </a:cxn>
+              <a:cxn ang="0">
+                <a:pos x="connsiteX15" y="connsiteY15"/>
+              </a:cxn>
+              <a:cxn ang="0">
+                <a:pos x="connsiteX16" y="connsiteY16"/>
+              </a:cxn>
+              <a:cxn ang="0">
+                <a:pos x="connsiteX17" y="connsiteY17"/>
+              </a:cxn>
+              <a:cxn ang="0">
+                <a:pos x="connsiteX18" y="connsiteY18"/>
+              </a:cxn>
+              <a:cxn ang="0">
+                <a:pos x="connsiteX19" y="connsiteY19"/>
+              </a:cxn>
+            </a:cxnLst>
+            <a:rect l="l" t="t" r="r" b="b"/>
+            <a:pathLst>
+              <a:path w="6858000" h="5556552">
+                <a:moveTo>
+                  <a:pt x="6858000" y="3445704"/>
+                </a:moveTo>
+                <a:lnTo>
+                  <a:pt x="3829242" y="5433322"/>
+                </a:lnTo>
+                <a:lnTo>
+                  <a:pt x="3827369" y="5434867"/>
+                </a:lnTo>
+                <a:lnTo>
+                  <a:pt x="3824583" y="5436378"/>
+                </a:lnTo>
+                <a:lnTo>
+                  <a:pt x="3798693" y="5453370"/>
+                </a:lnTo>
+                <a:lnTo>
+                  <a:pt x="3785011" y="5457858"/>
+                </a:lnTo>
+                <a:lnTo>
+                  <a:pt x="3706339" y="5500559"/>
+                </a:lnTo>
+                <a:cubicBezTo>
+                  <a:pt x="3621096" y="5536614"/>
+                  <a:pt x="3527375" y="5556552"/>
+                  <a:pt x="3428998" y="5556552"/>
+                </a:cubicBezTo>
+                <a:cubicBezTo>
+                  <a:pt x="3330621" y="5556552"/>
+                  <a:pt x="3236901" y="5536614"/>
+                  <a:pt x="3151658" y="5500559"/>
+                </a:cubicBezTo>
+                <a:lnTo>
+                  <a:pt x="3072996" y="5457863"/>
+                </a:lnTo>
+                <a:lnTo>
+                  <a:pt x="3059298" y="5453370"/>
+                </a:lnTo>
+                <a:lnTo>
+                  <a:pt x="3033383" y="5436362"/>
+                </a:lnTo>
+                <a:lnTo>
+                  <a:pt x="3030627" y="5434867"/>
+                </a:lnTo>
+                <a:lnTo>
+                  <a:pt x="3028775" y="5433338"/>
+                </a:lnTo>
+                <a:lnTo>
+                  <a:pt x="0" y="3445704"/>
+                </a:lnTo>
+                <a:close/>
+                <a:moveTo>
+                  <a:pt x="6858000" y="0"/>
+                </a:moveTo>
+                <a:lnTo>
+                  <a:pt x="6858000" y="349336"/>
+                </a:lnTo>
+                <a:lnTo>
+                  <a:pt x="6858000" y="3445703"/>
+                </a:lnTo>
+                <a:lnTo>
+                  <a:pt x="0" y="3445703"/>
+                </a:lnTo>
+                <a:lnTo>
+                  <a:pt x="0" y="0"/>
+                </a:lnTo>
+                <a:close/>
+              </a:path>
+            </a:pathLst>
+          </a:custGeom>
+          <a:ln>
+            <a:noFill/>
+          </a:ln>
+          <a:effectLst/>
+          <a:extLst>
+            <a:ext uri="{91240B29-F687-4f45-9708-019B960494DF}">
+              <a14:hiddenLine xmlns="" xmlns:a16="http://schemas.microsoft.com/office/drawing/2014/main" xmlns:p14="http://schemas.microsoft.com/office/powerpoint/2010/main" xmlns:a14="http://schemas.microsoft.com/office/drawing/2010/main" w="9525">
+                <a:solidFill>
+                  <a:srgbClr val="000000"/>
+                </a:solidFill>
+                <a:round/>
+                <a:headEnd/>
+                <a:tailEnd/>
+              </a14:hiddenLine>
+            </a:ext>
+          </a:extLst>
+        </p:spPr>
+        <p:style>
+          <a:lnRef idx="1">
+            <a:schemeClr val="accent1"/>
+          </a:lnRef>
+          <a:fillRef idx="3">
+            <a:schemeClr val="accent1"/>
+          </a:fillRef>
+          <a:effectRef idx="2">
+            <a:schemeClr val="accent1"/>
+          </a:effectRef>
+          <a:fontRef idx="minor">
+            <a:schemeClr val="lt1"/>
+          </a:fontRef>
+        </p:style>
+      </p:sp>
       <p:sp>
         <p:nvSpPr>
           <p:cNvPr id="2" name="Title 1">
@@ -5628,9 +6394,16 @@
             <p:ph type="title"/>
           </p:nvPr>
         </p:nvSpPr>
-        <p:spPr/>
-        <p:txBody>
-          <a:bodyPr/>
+        <p:spPr>
+          <a:xfrm>
+            <a:off x="451515" y="1734857"/>
+            <a:ext cx="3765483" cy="3388287"/>
+          </a:xfrm>
+        </p:spPr>
+        <p:txBody>
+          <a:bodyPr anchor="ctr">
+            <a:normAutofit/>
+          </a:bodyPr>
           <a:lstStyle/>
           <a:p>
             <a:r>
@@ -5642,7 +6415,7 @@
       </p:sp>
       <p:sp>
         <p:nvSpPr>
-          <p:cNvPr id="3" name="Content Placeholder 2">
+          <p:cNvPr id="7" name="Content Placeholder 2">
             <a:extLst>
               <a:ext uri="{FF2B5EF4-FFF2-40B4-BE49-F238E27FC236}">
                 <a16:creationId xmlns:a16="http://schemas.microsoft.com/office/drawing/2014/main" id="{002E59EF-7536-4970-B11A-D6DF98138578}"/>
@@ -5656,26 +6429,82 @@
             <p:ph idx="1"/>
           </p:nvPr>
         </p:nvSpPr>
-        <p:spPr/>
-        <p:txBody>
-          <a:bodyPr/>
+        <p:spPr>
+          <a:xfrm>
+            <a:off x="6008068" y="978993"/>
+            <a:ext cx="5365218" cy="4900014"/>
+          </a:xfrm>
+          <a:effectLst/>
+        </p:spPr>
+        <p:txBody>
+          <a:bodyPr>
+            <a:normAutofit/>
+          </a:bodyPr>
           <a:lstStyle/>
           <a:p>
             <a:r>
               <a:rPr lang="en-US" dirty="0"/>
-              <a:t>Git</a:t>
-            </a:r>
-          </a:p>
-          <a:p>
+              <a:t>Source Control</a:t>
+            </a:r>
+          </a:p>
+          <a:p>
+            <a:pPr lvl="1"/>
+            <a:r>
+              <a:rPr lang="en-US" dirty="0"/>
+              <a:t>Github</a:t>
+            </a:r>
+          </a:p>
+          <a:p>
+            <a:r>
+              <a:rPr lang="en-US" dirty="0"/>
+              <a:t>Communication</a:t>
+            </a:r>
+          </a:p>
+          <a:p>
+            <a:pPr lvl="1"/>
             <a:r>
               <a:rPr lang="en-US" dirty="0"/>
               <a:t>Slack</a:t>
             </a:r>
           </a:p>
           <a:p>
+            <a:pPr lvl="1"/>
+            <a:r>
+              <a:rPr lang="en-US" dirty="0"/>
+              <a:t>Slack incorporated with github</a:t>
+            </a:r>
+          </a:p>
+          <a:p>
             <a:r>
               <a:rPr lang="en-US" dirty="0"/>
               <a:t>Participation</a:t>
+            </a:r>
+          </a:p>
+          <a:p>
+            <a:pPr lvl="1"/>
+            <a:r>
+              <a:rPr lang="en-US" dirty="0"/>
+              <a:t>Voluntary</a:t>
+            </a:r>
+          </a:p>
+          <a:p>
+            <a:r>
+              <a:rPr lang="en-US" dirty="0"/>
+              <a:t>Organization</a:t>
+            </a:r>
+          </a:p>
+          <a:p>
+            <a:pPr lvl="1"/>
+            <a:r>
+              <a:rPr lang="en-US" dirty="0"/>
+              <a:t>Charter</a:t>
+            </a:r>
+          </a:p>
+          <a:p>
+            <a:pPr lvl="1"/>
+            <a:r>
+              <a:rPr lang="en-US" dirty="0"/>
+              <a:t>Retrospectives</a:t>
             </a:r>
           </a:p>
           <a:p>
@@ -5699,6 +6528,14 @@
 <file path=ppt/slides/slide4.xml><?xml version="1.0" encoding="utf-8"?>
 <p:sld xmlns:a="http://schemas.openxmlformats.org/drawingml/2006/main" xmlns:r="http://schemas.openxmlformats.org/officeDocument/2006/relationships" xmlns:p="http://schemas.openxmlformats.org/presentationml/2006/main">
   <p:cSld>
+    <p:bg>
+      <p:bgPr>
+        <a:solidFill>
+          <a:schemeClr val="bg1"/>
+        </a:solidFill>
+        <a:effectLst/>
+      </p:bgPr>
+    </p:bg>
     <p:spTree>
       <p:nvGrpSpPr>
         <p:cNvPr id="1" name=""/>
@@ -5715,93 +6552,389 @@
       </p:grpSpPr>
       <p:sp>
         <p:nvSpPr>
-          <p:cNvPr id="2" name="Title 1">
+          <p:cNvPr id="12" name="Freeform 6">
             <a:extLst>
               <a:ext uri="{FF2B5EF4-FFF2-40B4-BE49-F238E27FC236}">
-                <a16:creationId xmlns:a16="http://schemas.microsoft.com/office/drawing/2014/main" id="{CC78B2D3-3E03-4CC3-88FE-2106218A6660}"/>
+                <a16:creationId xmlns:a16="http://schemas.microsoft.com/office/drawing/2014/main" id="{53576798-7F98-4C7F-B6C7-6D41B5A7E927}"/>
               </a:ext>
             </a:extLst>
           </p:cNvPr>
           <p:cNvSpPr>
-            <a:spLocks noGrp="1"/>
-          </p:cNvSpPr>
-          <p:nvPr>
-            <p:ph type="title"/>
-          </p:nvPr>
-        </p:nvSpPr>
-        <p:spPr/>
-        <p:txBody>
-          <a:bodyPr/>
-          <a:lstStyle/>
-          <a:p>
-            <a:r>
-              <a:rPr lang="en-US" dirty="0"/>
-              <a:t>Project Requirements</a:t>
-            </a:r>
-          </a:p>
-        </p:txBody>
-      </p:sp>
-      <p:sp>
-        <p:nvSpPr>
-          <p:cNvPr id="3" name="Content Placeholder 2">
+            <a:spLocks noGrp="1" noRot="1" noChangeAspect="1" noMove="1" noResize="1" noEditPoints="1" noAdjustHandles="1" noChangeArrowheads="1" noChangeShapeType="1" noTextEdit="1"/>
+          </p:cNvSpPr>
+          <p:nvPr>
+            <p:extLst>
+              <p:ext uri="{386F3935-93C4-4BCD-93E2-E3B085C9AB24}">
+                <p16:designElem xmlns:p16="http://schemas.microsoft.com/office/powerpoint/2015/main" val="1"/>
+              </p:ext>
+            </p:extLst>
+          </p:nvPr>
+        </p:nvSpPr>
+        <p:spPr bwMode="auto">
+          <a:xfrm>
+            <a:off x="0" y="0"/>
+            <a:ext cx="12192000" cy="2185988"/>
+          </a:xfrm>
+          <a:custGeom>
+            <a:avLst/>
+            <a:gdLst/>
+            <a:ahLst/>
+            <a:cxnLst/>
+            <a:rect l="0" t="0" r="r" b="b"/>
+            <a:pathLst>
+              <a:path w="5760" h="1377">
+                <a:moveTo>
+                  <a:pt x="5760" y="0"/>
+                </a:moveTo>
+                <a:lnTo>
+                  <a:pt x="0" y="0"/>
+                </a:lnTo>
+                <a:lnTo>
+                  <a:pt x="0" y="1189"/>
+                </a:lnTo>
+                <a:lnTo>
+                  <a:pt x="943" y="1189"/>
+                </a:lnTo>
+                <a:lnTo>
+                  <a:pt x="1123" y="1369"/>
+                </a:lnTo>
+                <a:lnTo>
+                  <a:pt x="1123" y="1369"/>
+                </a:lnTo>
+                <a:lnTo>
+                  <a:pt x="1127" y="1371"/>
+                </a:lnTo>
+                <a:lnTo>
+                  <a:pt x="1133" y="1374"/>
+                </a:lnTo>
+                <a:lnTo>
+                  <a:pt x="1139" y="1377"/>
+                </a:lnTo>
+                <a:lnTo>
+                  <a:pt x="1144" y="1377"/>
+                </a:lnTo>
+                <a:lnTo>
+                  <a:pt x="1150" y="1377"/>
+                </a:lnTo>
+                <a:lnTo>
+                  <a:pt x="1155" y="1374"/>
+                </a:lnTo>
+                <a:lnTo>
+                  <a:pt x="1161" y="1371"/>
+                </a:lnTo>
+                <a:lnTo>
+                  <a:pt x="1165" y="1369"/>
+                </a:lnTo>
+                <a:lnTo>
+                  <a:pt x="1345" y="1189"/>
+                </a:lnTo>
+                <a:lnTo>
+                  <a:pt x="5760" y="1189"/>
+                </a:lnTo>
+                <a:lnTo>
+                  <a:pt x="5760" y="0"/>
+                </a:lnTo>
+                <a:close/>
+              </a:path>
+            </a:pathLst>
+          </a:custGeom>
+          <a:ln/>
+          <a:extLst>
+            <a:ext uri="{91240B29-F687-4f45-9708-019B960494DF}">
+              <a14:hiddenLine xmlns="" xmlns:p14="http://schemas.microsoft.com/office/powerpoint/2010/main" xmlns:a14="http://schemas.microsoft.com/office/drawing/2010/main" w="9525">
+                <a:solidFill>
+                  <a:srgbClr val="000000"/>
+                </a:solidFill>
+                <a:round/>
+                <a:headEnd/>
+                <a:tailEnd/>
+              </a14:hiddenLine>
+            </a:ext>
+          </a:extLst>
+        </p:spPr>
+        <p:style>
+          <a:lnRef idx="1">
+            <a:schemeClr val="accent1"/>
+          </a:lnRef>
+          <a:fillRef idx="3">
+            <a:schemeClr val="accent1"/>
+          </a:fillRef>
+          <a:effectRef idx="2">
+            <a:schemeClr val="accent1"/>
+          </a:effectRef>
+          <a:fontRef idx="minor">
+            <a:schemeClr val="lt1"/>
+          </a:fontRef>
+        </p:style>
+      </p:sp>
+      <p:sp>
+        <p:nvSpPr>
+          <p:cNvPr id="14" name="Rectangle 13">
             <a:extLst>
               <a:ext uri="{FF2B5EF4-FFF2-40B4-BE49-F238E27FC236}">
-                <a16:creationId xmlns:a16="http://schemas.microsoft.com/office/drawing/2014/main" id="{BBDD7313-8F74-407B-B69B-DDF946213F0A}"/>
+                <a16:creationId xmlns:a16="http://schemas.microsoft.com/office/drawing/2014/main" id="{E2264E67-6F59-4D8D-8E5F-8245B0FEAE76}"/>
               </a:ext>
             </a:extLst>
           </p:cNvPr>
           <p:cNvSpPr>
-            <a:spLocks noGrp="1"/>
-          </p:cNvSpPr>
-          <p:nvPr>
-            <p:ph idx="1"/>
-          </p:nvPr>
-        </p:nvSpPr>
-        <p:spPr/>
-        <p:txBody>
-          <a:bodyPr/>
-          <a:lstStyle/>
-          <a:p>
-            <a:r>
-              <a:rPr lang="en-US" dirty="0"/>
-              <a:t>Use cases</a:t>
-            </a:r>
-          </a:p>
-          <a:p>
-            <a:r>
-              <a:rPr lang="en-US" dirty="0"/>
-              <a:t>non functional requirements</a:t>
-            </a:r>
-          </a:p>
-          <a:p>
-            <a:pPr lvl="1"/>
-            <a:r>
-              <a:rPr lang="en-US" dirty="0"/>
-              <a:t>precision</a:t>
-            </a:r>
-          </a:p>
-          <a:p>
-            <a:pPr lvl="1"/>
-            <a:r>
-              <a:rPr lang="en-US" dirty="0"/>
-              <a:t>java</a:t>
-            </a:r>
+            <a:spLocks noGrp="1" noRot="1" noChangeAspect="1" noMove="1" noResize="1" noEditPoints="1" noAdjustHandles="1" noChangeArrowheads="1" noChangeShapeType="1" noTextEdit="1"/>
+          </p:cNvSpPr>
+          <p:nvPr>
+            <p:extLst>
+              <p:ext uri="{386F3935-93C4-4BCD-93E2-E3B085C9AB24}">
+                <p16:designElem xmlns:p16="http://schemas.microsoft.com/office/powerpoint/2015/main" val="1"/>
+              </p:ext>
+            </p:extLst>
+          </p:nvPr>
+        </p:nvSpPr>
+        <p:spPr>
+          <a:xfrm>
+            <a:off x="4573" y="0"/>
+            <a:ext cx="12187427" cy="6858000"/>
+          </a:xfrm>
+          <a:prstGeom prst="rect">
+            <a:avLst/>
+          </a:prstGeom>
+          <a:solidFill>
+            <a:schemeClr val="bg1"/>
+          </a:solidFill>
+          <a:ln>
+            <a:noFill/>
+          </a:ln>
+        </p:spPr>
+        <p:style>
+          <a:lnRef idx="2">
+            <a:schemeClr val="accent1">
+              <a:shade val="50000"/>
+            </a:schemeClr>
+          </a:lnRef>
+          <a:fillRef idx="1">
+            <a:schemeClr val="accent1"/>
+          </a:fillRef>
+          <a:effectRef idx="0">
+            <a:schemeClr val="accent1"/>
+          </a:effectRef>
+          <a:fontRef idx="minor">
+            <a:schemeClr val="lt1"/>
+          </a:fontRef>
+        </p:style>
+        <p:txBody>
+          <a:bodyPr rtlCol="0" anchor="ctr"/>
+          <a:lstStyle/>
+          <a:p>
+            <a:pPr algn="ctr"/>
+            <a:endParaRPr lang="en-US"/>
+          </a:p>
+        </p:txBody>
+      </p:sp>
+      <p:sp>
+        <p:nvSpPr>
+          <p:cNvPr id="16" name="Freeform 23">
+            <a:extLst>
+              <a:ext uri="{FF2B5EF4-FFF2-40B4-BE49-F238E27FC236}">
+                <a16:creationId xmlns:a16="http://schemas.microsoft.com/office/drawing/2014/main" id="{158E1C6E-D299-4F5D-B15B-155EBF7F62FD}"/>
+              </a:ext>
+            </a:extLst>
+          </p:cNvPr>
+          <p:cNvSpPr>
+            <a:spLocks noGrp="1" noRot="1" noChangeAspect="1" noMove="1" noResize="1" noEditPoints="1" noAdjustHandles="1" noChangeArrowheads="1" noChangeShapeType="1" noTextEdit="1"/>
+          </p:cNvSpPr>
+          <p:nvPr>
+            <p:extLst>
+              <p:ext uri="{386F3935-93C4-4BCD-93E2-E3B085C9AB24}">
+                <p16:designElem xmlns:p16="http://schemas.microsoft.com/office/powerpoint/2015/main" val="1"/>
+              </p:ext>
+            </p:extLst>
+          </p:nvPr>
+        </p:nvSpPr>
+        <p:spPr bwMode="white">
+          <a:xfrm>
+            <a:off x="0" y="0"/>
+            <a:ext cx="4637005" cy="6858000"/>
+          </a:xfrm>
+          <a:custGeom>
+            <a:avLst/>
+            <a:gdLst>
+              <a:gd name="connsiteX0" fmla="*/ 0 w 4637005"/>
+              <a:gd name="connsiteY0" fmla="*/ 0 h 6858000"/>
+              <a:gd name="connsiteX1" fmla="*/ 4637005 w 4637005"/>
+              <a:gd name="connsiteY1" fmla="*/ 0 h 6858000"/>
+              <a:gd name="connsiteX2" fmla="*/ 4637005 w 4637005"/>
+              <a:gd name="connsiteY2" fmla="*/ 1900238 h 6858000"/>
+              <a:gd name="connsiteX3" fmla="*/ 4266589 w 4637005"/>
+              <a:gd name="connsiteY3" fmla="*/ 2178050 h 6858000"/>
+              <a:gd name="connsiteX4" fmla="*/ 4262355 w 4637005"/>
+              <a:gd name="connsiteY4" fmla="*/ 2184400 h 6858000"/>
+              <a:gd name="connsiteX5" fmla="*/ 4256005 w 4637005"/>
+              <a:gd name="connsiteY5" fmla="*/ 2193925 h 6858000"/>
+              <a:gd name="connsiteX6" fmla="*/ 4249655 w 4637005"/>
+              <a:gd name="connsiteY6" fmla="*/ 2201863 h 6858000"/>
+              <a:gd name="connsiteX7" fmla="*/ 4249655 w 4637005"/>
+              <a:gd name="connsiteY7" fmla="*/ 2211388 h 6858000"/>
+              <a:gd name="connsiteX8" fmla="*/ 4249655 w 4637005"/>
+              <a:gd name="connsiteY8" fmla="*/ 2220913 h 6858000"/>
+              <a:gd name="connsiteX9" fmla="*/ 4256005 w 4637005"/>
+              <a:gd name="connsiteY9" fmla="*/ 2228850 h 6858000"/>
+              <a:gd name="connsiteX10" fmla="*/ 4262355 w 4637005"/>
+              <a:gd name="connsiteY10" fmla="*/ 2238375 h 6858000"/>
+              <a:gd name="connsiteX11" fmla="*/ 4266589 w 4637005"/>
+              <a:gd name="connsiteY11" fmla="*/ 2244725 h 6858000"/>
+              <a:gd name="connsiteX12" fmla="*/ 4637005 w 4637005"/>
+              <a:gd name="connsiteY12" fmla="*/ 2522538 h 6858000"/>
+              <a:gd name="connsiteX13" fmla="*/ 4637005 w 4637005"/>
+              <a:gd name="connsiteY13" fmla="*/ 6858000 h 6858000"/>
+              <a:gd name="connsiteX14" fmla="*/ 0 w 4637005"/>
+              <a:gd name="connsiteY14" fmla="*/ 6858000 h 6858000"/>
+            </a:gdLst>
+            <a:ahLst/>
+            <a:cxnLst>
+              <a:cxn ang="0">
+                <a:pos x="connsiteX0" y="connsiteY0"/>
+              </a:cxn>
+              <a:cxn ang="0">
+                <a:pos x="connsiteX1" y="connsiteY1"/>
+              </a:cxn>
+              <a:cxn ang="0">
+                <a:pos x="connsiteX2" y="connsiteY2"/>
+              </a:cxn>
+              <a:cxn ang="0">
+                <a:pos x="connsiteX3" y="connsiteY3"/>
+              </a:cxn>
+              <a:cxn ang="0">
+                <a:pos x="connsiteX4" y="connsiteY4"/>
+              </a:cxn>
+              <a:cxn ang="0">
+                <a:pos x="connsiteX5" y="connsiteY5"/>
+              </a:cxn>
+              <a:cxn ang="0">
+                <a:pos x="connsiteX6" y="connsiteY6"/>
+              </a:cxn>
+              <a:cxn ang="0">
+                <a:pos x="connsiteX7" y="connsiteY7"/>
+              </a:cxn>
+              <a:cxn ang="0">
+                <a:pos x="connsiteX8" y="connsiteY8"/>
+              </a:cxn>
+              <a:cxn ang="0">
+                <a:pos x="connsiteX9" y="connsiteY9"/>
+              </a:cxn>
+              <a:cxn ang="0">
+                <a:pos x="connsiteX10" y="connsiteY10"/>
+              </a:cxn>
+              <a:cxn ang="0">
+                <a:pos x="connsiteX11" y="connsiteY11"/>
+              </a:cxn>
+              <a:cxn ang="0">
+                <a:pos x="connsiteX12" y="connsiteY12"/>
+              </a:cxn>
+              <a:cxn ang="0">
+                <a:pos x="connsiteX13" y="connsiteY13"/>
+              </a:cxn>
+              <a:cxn ang="0">
+                <a:pos x="connsiteX14" y="connsiteY14"/>
+              </a:cxn>
+            </a:cxnLst>
+            <a:rect l="l" t="t" r="r" b="b"/>
+            <a:pathLst>
+              <a:path w="4637005" h="6858000">
+                <a:moveTo>
+                  <a:pt x="0" y="0"/>
+                </a:moveTo>
+                <a:lnTo>
+                  <a:pt x="4637005" y="0"/>
+                </a:lnTo>
+                <a:lnTo>
+                  <a:pt x="4637005" y="1900238"/>
+                </a:lnTo>
+                <a:lnTo>
+                  <a:pt x="4266589" y="2178050"/>
+                </a:lnTo>
+                <a:lnTo>
+                  <a:pt x="4262355" y="2184400"/>
+                </a:lnTo>
+                <a:lnTo>
+                  <a:pt x="4256005" y="2193925"/>
+                </a:lnTo>
+                <a:lnTo>
+                  <a:pt x="4249655" y="2201863"/>
+                </a:lnTo>
+                <a:lnTo>
+                  <a:pt x="4249655" y="2211388"/>
+                </a:lnTo>
+                <a:lnTo>
+                  <a:pt x="4249655" y="2220913"/>
+                </a:lnTo>
+                <a:lnTo>
+                  <a:pt x="4256005" y="2228850"/>
+                </a:lnTo>
+                <a:lnTo>
+                  <a:pt x="4262355" y="2238375"/>
+                </a:lnTo>
+                <a:lnTo>
+                  <a:pt x="4266589" y="2244725"/>
+                </a:lnTo>
+                <a:lnTo>
+                  <a:pt x="4637005" y="2522538"/>
+                </a:lnTo>
+                <a:lnTo>
+                  <a:pt x="4637005" y="6858000"/>
+                </a:lnTo>
+                <a:lnTo>
+                  <a:pt x="0" y="6858000"/>
+                </a:lnTo>
+                <a:close/>
+              </a:path>
+            </a:pathLst>
+          </a:custGeom>
+          <a:solidFill>
+            <a:srgbClr val="212121"/>
+          </a:solidFill>
+          <a:ln>
+            <a:noFill/>
+            <a:headEnd/>
+            <a:tailEnd/>
+          </a:ln>
+        </p:spPr>
+        <p:style>
+          <a:lnRef idx="1">
+            <a:schemeClr val="accent1"/>
+          </a:lnRef>
+          <a:fillRef idx="3">
+            <a:schemeClr val="accent1"/>
+          </a:fillRef>
+          <a:effectRef idx="2">
+            <a:schemeClr val="accent1"/>
+          </a:effectRef>
+          <a:fontRef idx="minor">
+            <a:schemeClr val="lt1"/>
+          </a:fontRef>
+        </p:style>
+        <p:txBody>
+          <a:bodyPr wrap="square" rtlCol="0" anchor="ctr">
+            <a:noAutofit/>
+          </a:bodyPr>
+          <a:lstStyle/>
+          <a:p>
+            <a:pPr algn="ctr"/>
+            <a:endParaRPr lang="en-US"/>
           </a:p>
         </p:txBody>
       </p:sp>
       <p:pic>
         <p:nvPicPr>
-          <p:cNvPr id="4" name="Picture 3">
+          <p:cNvPr id="7" name="Content Placeholder 6">
             <a:extLst>
               <a:ext uri="{FF2B5EF4-FFF2-40B4-BE49-F238E27FC236}">
-                <a16:creationId xmlns:a16="http://schemas.microsoft.com/office/drawing/2014/main" id="{1831D2C5-F305-4797-913C-8F598596EA81}"/>
+                <a16:creationId xmlns:a16="http://schemas.microsoft.com/office/drawing/2014/main" id="{E6017ECF-11CD-4C0C-9B11-E6F1280A3180}"/>
               </a:ext>
             </a:extLst>
           </p:cNvPr>
           <p:cNvPicPr>
-            <a:picLocks noChangeAspect="1"/>
+            <a:picLocks noGrp="1" noChangeAspect="1"/>
           </p:cNvPicPr>
-          <p:nvPr/>
+          <p:nvPr>
+            <p:ph sz="half" idx="2"/>
+          </p:nvPr>
         </p:nvPicPr>
         <p:blipFill>
           <a:blip r:embed="rId2"/>
@@ -5811,14 +6944,133 @@
         </p:blipFill>
         <p:spPr>
           <a:xfrm>
-            <a:off x="5044965" y="2342159"/>
-            <a:ext cx="4590663" cy="4021854"/>
+            <a:off x="5401849" y="643467"/>
+            <a:ext cx="6025624" cy="5272421"/>
           </a:xfrm>
-          <a:prstGeom prst="rect">
-            <a:avLst/>
+          <a:prstGeom prst="roundRect">
+            <a:avLst>
+              <a:gd name="adj" fmla="val 3876"/>
+            </a:avLst>
           </a:prstGeom>
+          <a:ln>
+            <a:solidFill>
+              <a:schemeClr val="accent1"/>
+            </a:solidFill>
+          </a:ln>
+          <a:effectLst/>
         </p:spPr>
       </p:pic>
+      <p:sp>
+        <p:nvSpPr>
+          <p:cNvPr id="2" name="Title 1">
+            <a:extLst>
+              <a:ext uri="{FF2B5EF4-FFF2-40B4-BE49-F238E27FC236}">
+                <a16:creationId xmlns:a16="http://schemas.microsoft.com/office/drawing/2014/main" id="{CC78B2D3-3E03-4CC3-88FE-2106218A6660}"/>
+              </a:ext>
+            </a:extLst>
+          </p:cNvPr>
+          <p:cNvSpPr>
+            <a:spLocks noGrp="1"/>
+          </p:cNvSpPr>
+          <p:nvPr>
+            <p:ph type="title"/>
+          </p:nvPr>
+        </p:nvSpPr>
+        <p:spPr>
+          <a:xfrm>
+            <a:off x="451514" y="457201"/>
+            <a:ext cx="3575737" cy="1332688"/>
+          </a:xfrm>
+        </p:spPr>
+        <p:txBody>
+          <a:bodyPr vert="horz" lIns="91440" tIns="45720" rIns="91440" bIns="45720" rtlCol="0" anchor="b">
+            <a:normAutofit/>
+          </a:bodyPr>
+          <a:lstStyle/>
+          <a:p>
+            <a:pPr algn="ctr"/>
+            <a:r>
+              <a:rPr lang="en-US" sz="3200">
+                <a:solidFill>
+                  <a:srgbClr val="FFFFFF"/>
+                </a:solidFill>
+              </a:rPr>
+              <a:t>Project Requirements</a:t>
+            </a:r>
+          </a:p>
+        </p:txBody>
+      </p:sp>
+      <p:sp>
+        <p:nvSpPr>
+          <p:cNvPr id="3" name="Content Placeholder 2">
+            <a:extLst>
+              <a:ext uri="{FF2B5EF4-FFF2-40B4-BE49-F238E27FC236}">
+                <a16:creationId xmlns:a16="http://schemas.microsoft.com/office/drawing/2014/main" id="{BBDD7313-8F74-407B-B69B-DDF946213F0A}"/>
+              </a:ext>
+            </a:extLst>
+          </p:cNvPr>
+          <p:cNvSpPr>
+            <a:spLocks noGrp="1"/>
+          </p:cNvSpPr>
+          <p:nvPr>
+            <p:ph sz="half" idx="1"/>
+          </p:nvPr>
+        </p:nvSpPr>
+        <p:spPr>
+          <a:xfrm>
+            <a:off x="451514" y="2046514"/>
+            <a:ext cx="3575737" cy="3994848"/>
+          </a:xfrm>
+        </p:spPr>
+        <p:txBody>
+          <a:bodyPr vert="horz" lIns="91440" tIns="45720" rIns="91440" bIns="45720" rtlCol="0" anchor="ctr">
+            <a:normAutofit/>
+          </a:bodyPr>
+          <a:lstStyle/>
+          <a:p>
+            <a:r>
+              <a:rPr lang="en-US" sz="1600" dirty="0">
+                <a:solidFill>
+                  <a:srgbClr val="FFFFFF"/>
+                </a:solidFill>
+              </a:rPr>
+              <a:t>Use cases</a:t>
+            </a:r>
+          </a:p>
+          <a:p>
+            <a:r>
+              <a:rPr lang="en-US" sz="1600" dirty="0">
+                <a:solidFill>
+                  <a:srgbClr val="FFFFFF"/>
+                </a:solidFill>
+              </a:rPr>
+              <a:t>Non Functional Requirements</a:t>
+            </a:r>
+          </a:p>
+          <a:p>
+            <a:pPr lvl="1"/>
+            <a:r>
+              <a:rPr lang="en-US" dirty="0">
+                <a:solidFill>
+                  <a:srgbClr val="FFFFFF"/>
+                </a:solidFill>
+              </a:rPr>
+              <a:t>Number Precision</a:t>
+            </a:r>
+          </a:p>
+          <a:p>
+            <a:pPr lvl="1"/>
+            <a:r>
+              <a:rPr lang="en-US" dirty="0">
+                <a:solidFill>
+                  <a:srgbClr val="FFFFFF"/>
+                </a:solidFill>
+              </a:rPr>
+              <a:t>Java</a:t>
+            </a:r>
+          </a:p>
+        </p:txBody>
+      </p:sp>
     </p:spTree>
     <p:extLst>
       <p:ext uri="{BB962C8B-B14F-4D97-AF65-F5344CB8AC3E}">
@@ -5827,7 +7079,7 @@
     </p:extLst>
   </p:cSld>
   <p:clrMapOvr>
-    <a:masterClrMapping/>
+    <a:overrideClrMapping bg1="lt1" tx1="dk1" bg2="lt2" tx2="dk2" accent1="accent1" accent2="accent2" accent3="accent3" accent4="accent4" accent5="accent5" accent6="accent6" hlink="hlink" folHlink="folHlink"/>
   </p:clrMapOvr>
 </p:sld>
 </file>
@@ -5995,19 +7247,14 @@
           <a:p>
             <a:r>
               <a:rPr lang="en-US" dirty="0"/>
-              <a:t>Test Plan – Last Lab</a:t>
+              <a:t>Test Plan – Lab 13?</a:t>
             </a:r>
           </a:p>
           <a:p>
             <a:r>
               <a:rPr lang="en-US" dirty="0"/>
-              <a:t>Test Cases – show that the </a:t>
-            </a:r>
-            <a:r>
-              <a:rPr lang="en-US"/>
-              <a:t>system works</a:t>
-            </a:r>
-            <a:endParaRPr lang="en-US" dirty="0"/>
+              <a:t>Test Cases – show that the system works</a:t>
+            </a:r>
           </a:p>
         </p:txBody>
       </p:sp>
@@ -6101,7 +7348,7 @@
             <a:pPr lvl="1"/>
             <a:r>
               <a:rPr lang="en-US" dirty="0"/>
-              <a:t>Sprint 1 : none</a:t>
+              <a:t>Sprint 1: none</a:t>
             </a:r>
           </a:p>
           <a:p>
@@ -6116,6 +7363,41 @@
             <a:r>
               <a:rPr lang="en-US" dirty="0"/>
               <a:t>Sprint 3: </a:t>
+            </a:r>
+          </a:p>
+          <a:p>
+            <a:pPr lvl="2"/>
+            <a:r>
+              <a:rPr lang="en-US" dirty="0"/>
+              <a:t>DNF, PRINT, EXPORT and SWAP functions with specified number (in GUI) </a:t>
+            </a:r>
+          </a:p>
+          <a:p>
+            <a:pPr lvl="2"/>
+            <a:r>
+              <a:rPr lang="en-US" dirty="0"/>
+              <a:t>PRINT will either print current run or previous run and not a specified run number when using the GUI</a:t>
+            </a:r>
+          </a:p>
+          <a:p>
+            <a:pPr lvl="2"/>
+            <a:r>
+              <a:rPr lang="en-US" dirty="0"/>
+              <a:t>Separate thread handling for update display</a:t>
+            </a:r>
+          </a:p>
+          <a:p>
+            <a:pPr lvl="2"/>
+            <a:r>
+              <a:rPr lang="en-US" dirty="0"/>
+              <a:t>The RETURN function will return and display the updated racer’s queue</a:t>
+            </a:r>
+          </a:p>
+          <a:p>
+            <a:pPr lvl="2"/>
+            <a:r>
+              <a:rPr lang="en-US" dirty="0"/>
+              <a:t>The UP/DOWN/LEFT/RIGHT Arrow Buttons will cycle through executable commands</a:t>
             </a:r>
           </a:p>
         </p:txBody>
@@ -6201,32 +7483,45 @@
           <a:p>
             <a:r>
               <a:rPr lang="en-US" dirty="0"/>
-              <a:t>Riley</a:t>
+              <a:t>Riley – GUI and Simulator</a:t>
             </a:r>
           </a:p>
           <a:p>
             <a:r>
               <a:rPr lang="en-US" dirty="0"/>
-              <a:t>Philip</a:t>
+              <a:t>Philip – Chronotimer and GUI</a:t>
             </a:r>
           </a:p>
           <a:p>
             <a:r>
               <a:rPr lang="en-US" dirty="0"/>
-              <a:t>Andrew</a:t>
+              <a:t>Andrew – Chronotimer and Simulator</a:t>
             </a:r>
           </a:p>
           <a:p>
             <a:r>
               <a:rPr lang="en-US" dirty="0"/>
-              <a:t>Fue</a:t>
+              <a:t>Fue – Chronotimer and GUI</a:t>
             </a:r>
           </a:p>
           <a:p>
             <a:r>
               <a:rPr lang="en-US" dirty="0"/>
-              <a:t>Isaac</a:t>
-            </a:r>
+              <a:t>Isaac – </a:t>
+            </a:r>
+            <a:r>
+              <a:rPr lang="en-US" dirty="0" err="1"/>
+              <a:t>Chronotimer</a:t>
+            </a:r>
+            <a:r>
+              <a:rPr lang="en-US" dirty="0"/>
+              <a:t> </a:t>
+            </a:r>
+            <a:r>
+              <a:rPr lang="en-US"/>
+              <a:t>and Testing</a:t>
+            </a:r>
+            <a:endParaRPr lang="en-US" dirty="0"/>
           </a:p>
           <a:p>
             <a:endParaRPr lang="en-US" dirty="0"/>

</xml_diff>

<commit_message>
updating slideshow, only 1 slide for testing now
</commit_message>
<xml_diff>
--- a/Artifacts/Presentation/Fastwatch.pptx
+++ b/Artifacts/Presentation/Fastwatch.pptx
@@ -10,10 +10,9 @@
     <p:sldId id="264" r:id="rId4"/>
     <p:sldId id="266" r:id="rId5"/>
     <p:sldId id="260" r:id="rId6"/>
-    <p:sldId id="267" r:id="rId7"/>
-    <p:sldId id="261" r:id="rId8"/>
-    <p:sldId id="265" r:id="rId9"/>
-    <p:sldId id="262" r:id="rId10"/>
+    <p:sldId id="261" r:id="rId7"/>
+    <p:sldId id="265" r:id="rId8"/>
+    <p:sldId id="262" r:id="rId9"/>
   </p:sldIdLst>
   <p:sldSz cx="12192000" cy="6858000"/>
   <p:notesSz cx="6858000" cy="9144000"/>
@@ -215,7 +214,7 @@
           <a:effectLst/>
           <a:extLst>
             <a:ext uri="{91240B29-F687-4f45-9708-019B960494DF}">
-              <a14:hiddenLine xmlns="" xmlns:a14="http://schemas.microsoft.com/office/drawing/2010/main" w="9525">
+              <a14:hiddenLine xmlns:a14="http://schemas.microsoft.com/office/drawing/2010/main" xmlns="" w="9525">
                 <a:solidFill>
                   <a:srgbClr val="000000"/>
                 </a:solidFill>
@@ -1725,7 +1724,7 @@
           <a:ln/>
           <a:extLst>
             <a:ext uri="{91240B29-F687-4f45-9708-019B960494DF}">
-              <a14:hiddenLine xmlns="" xmlns:a14="http://schemas.microsoft.com/office/drawing/2010/main" w="9525">
+              <a14:hiddenLine xmlns:a14="http://schemas.microsoft.com/office/drawing/2010/main" xmlns="" w="9525">
                 <a:solidFill>
                   <a:srgbClr val="000000"/>
                 </a:solidFill>
@@ -1997,7 +1996,7 @@
           <a:ln/>
           <a:extLst>
             <a:ext uri="{91240B29-F687-4f45-9708-019B960494DF}">
-              <a14:hiddenLine xmlns="" xmlns:a14="http://schemas.microsoft.com/office/drawing/2010/main" w="9525">
+              <a14:hiddenLine xmlns:a14="http://schemas.microsoft.com/office/drawing/2010/main" xmlns="" w="9525">
                 <a:solidFill>
                   <a:srgbClr val="000000"/>
                 </a:solidFill>
@@ -2277,7 +2276,7 @@
           <a:ln/>
           <a:extLst>
             <a:ext uri="{91240B29-F687-4f45-9708-019B960494DF}">
-              <a14:hiddenLine xmlns="" xmlns:a14="http://schemas.microsoft.com/office/drawing/2010/main" w="9525">
+              <a14:hiddenLine xmlns:a14="http://schemas.microsoft.com/office/drawing/2010/main" xmlns="" w="9525">
                 <a:solidFill>
                   <a:srgbClr val="000000"/>
                 </a:solidFill>
@@ -2897,7 +2896,7 @@
           <a:ln/>
           <a:extLst>
             <a:ext uri="{91240B29-F687-4f45-9708-019B960494DF}">
-              <a14:hiddenLine xmlns="" xmlns:a14="http://schemas.microsoft.com/office/drawing/2010/main" w="9525">
+              <a14:hiddenLine xmlns:a14="http://schemas.microsoft.com/office/drawing/2010/main" xmlns="" w="9525">
                 <a:solidFill>
                   <a:srgbClr val="000000"/>
                 </a:solidFill>
@@ -3233,7 +3232,7 @@
           <a:ln/>
           <a:extLst>
             <a:ext uri="{91240B29-F687-4f45-9708-019B960494DF}">
-              <a14:hiddenLine xmlns="" xmlns:a14="http://schemas.microsoft.com/office/drawing/2010/main" w="9525">
+              <a14:hiddenLine xmlns:a14="http://schemas.microsoft.com/office/drawing/2010/main" xmlns="" w="9525">
                 <a:solidFill>
                   <a:srgbClr val="000000"/>
                 </a:solidFill>
@@ -3707,7 +3706,7 @@
           <a:ln/>
           <a:extLst>
             <a:ext uri="{91240B29-F687-4f45-9708-019B960494DF}">
-              <a14:hiddenLine xmlns="" xmlns:a14="http://schemas.microsoft.com/office/drawing/2010/main" w="9525">
+              <a14:hiddenLine xmlns:a14="http://schemas.microsoft.com/office/drawing/2010/main" xmlns="" w="9525">
                 <a:solidFill>
                   <a:srgbClr val="000000"/>
                 </a:solidFill>
@@ -4130,7 +4129,7 @@
           <a:ln/>
           <a:extLst>
             <a:ext uri="{91240B29-F687-4f45-9708-019B960494DF}">
-              <a14:hiddenLine xmlns="" xmlns:a14="http://schemas.microsoft.com/office/drawing/2010/main" w="9525">
+              <a14:hiddenLine xmlns:a14="http://schemas.microsoft.com/office/drawing/2010/main" xmlns="" w="9525">
                 <a:solidFill>
                   <a:srgbClr val="000000"/>
                 </a:solidFill>
@@ -5719,7 +5718,7 @@
           <a:effectLst/>
           <a:extLst>
             <a:ext uri="{91240B29-F687-4f45-9708-019B960494DF}">
-              <a14:hiddenLine xmlns:a14="http://schemas.microsoft.com/office/drawing/2010/main" xmlns:p14="http://schemas.microsoft.com/office/powerpoint/2010/main" xmlns:a16="http://schemas.microsoft.com/office/drawing/2014/main" xmlns="" w="9525">
+              <a14:hiddenLine xmlns="" xmlns:a16="http://schemas.microsoft.com/office/drawing/2014/main" xmlns:p14="http://schemas.microsoft.com/office/powerpoint/2010/main" xmlns:a14="http://schemas.microsoft.com/office/drawing/2010/main" w="9525">
                 <a:solidFill>
                   <a:srgbClr val="000000"/>
                 </a:solidFill>
@@ -6008,7 +6007,7 @@
           <a:ln/>
           <a:extLst>
             <a:ext uri="{91240B29-F687-4f45-9708-019B960494DF}">
-              <a14:hiddenLine xmlns:a14="http://schemas.microsoft.com/office/drawing/2010/main" xmlns:p14="http://schemas.microsoft.com/office/powerpoint/2010/main" xmlns="" w="9525">
+              <a14:hiddenLine xmlns="" xmlns:p14="http://schemas.microsoft.com/office/powerpoint/2010/main" xmlns:a14="http://schemas.microsoft.com/office/drawing/2010/main" w="9525">
                 <a:solidFill>
                   <a:srgbClr val="000000"/>
                 </a:solidFill>
@@ -6590,7 +6589,7 @@
           <a:effectLst/>
           <a:extLst>
             <a:ext uri="{91240B29-F687-4f45-9708-019B960494DF}">
-              <a14:hiddenLine xmlns:a14="http://schemas.microsoft.com/office/drawing/2010/main" xmlns:p14="http://schemas.microsoft.com/office/powerpoint/2010/main" xmlns="" w="9525">
+              <a14:hiddenLine xmlns="" xmlns:p14="http://schemas.microsoft.com/office/powerpoint/2010/main" xmlns:a14="http://schemas.microsoft.com/office/drawing/2010/main" w="9525">
                 <a:solidFill>
                   <a:srgbClr val="000000"/>
                 </a:solidFill>
@@ -6904,8 +6903,8 @@
         </p:blipFill>
         <p:spPr>
           <a:xfrm>
-            <a:off x="5280472" y="1031066"/>
-            <a:ext cx="6268062" cy="4622695"/>
+            <a:off x="5408415" y="1031066"/>
+            <a:ext cx="6012175" cy="4622695"/>
           </a:xfrm>
           <a:prstGeom prst="roundRect">
             <a:avLst>
@@ -6951,7 +6950,7 @@
             <a:pPr algn="l"/>
             <a:r>
               <a:rPr lang="en-US" sz="4400" dirty="0"/>
-              <a:t>Domain Model</a:t>
+              <a:t>Domain</a:t>
             </a:r>
             <a:br>
               <a:rPr lang="en-US" sz="4400" dirty="0"/>
@@ -7013,7 +7012,7 @@
           <a:p>
             <a:r>
               <a:rPr lang="en-US" dirty="0"/>
-              <a:t>Test Plan</a:t>
+              <a:t>Testing</a:t>
             </a:r>
           </a:p>
         </p:txBody>
@@ -8169,7 +8168,7 @@
           <p:cNvPr id="2" name="Title 1">
             <a:extLst>
               <a:ext uri="{FF2B5EF4-FFF2-40B4-BE49-F238E27FC236}">
-                <a16:creationId xmlns:a16="http://schemas.microsoft.com/office/drawing/2014/main" id="{661C3F0D-6EFD-4DC6-B67B-77CCF883F7A3}"/>
+                <a16:creationId xmlns:a16="http://schemas.microsoft.com/office/drawing/2014/main" id="{9A054362-6713-415D-9DC9-381F3A40ADE9}"/>
               </a:ext>
             </a:extLst>
           </p:cNvPr>
@@ -8187,7 +8186,7 @@
           <a:p>
             <a:r>
               <a:rPr lang="en-US" dirty="0"/>
-              <a:t>Test Cases</a:t>
+              <a:t>Iteration Plans</a:t>
             </a:r>
           </a:p>
         </p:txBody>
@@ -8197,7 +8196,7 @@
           <p:cNvPr id="3" name="Content Placeholder 2">
             <a:extLst>
               <a:ext uri="{FF2B5EF4-FFF2-40B4-BE49-F238E27FC236}">
-                <a16:creationId xmlns:a16="http://schemas.microsoft.com/office/drawing/2014/main" id="{F6406CB5-88F9-4669-971C-BD4A4D142F59}"/>
+                <a16:creationId xmlns:a16="http://schemas.microsoft.com/office/drawing/2014/main" id="{663C3BCE-A737-415F-9C7A-841A72747582}"/>
               </a:ext>
             </a:extLst>
           </p:cNvPr>
@@ -8210,12 +8209,77 @@
         </p:nvSpPr>
         <p:spPr/>
         <p:txBody>
-          <a:bodyPr/>
+          <a:bodyPr>
+            <a:normAutofit/>
+          </a:bodyPr>
           <a:lstStyle/>
           <a:p>
             <a:r>
               <a:rPr lang="en-US" dirty="0"/>
-              <a:t>Test Plan</a:t>
+              <a:t>Backlogs</a:t>
+            </a:r>
+          </a:p>
+          <a:p>
+            <a:pPr lvl="1"/>
+            <a:r>
+              <a:rPr lang="en-US" dirty="0"/>
+              <a:t>Sprint 1: none</a:t>
+            </a:r>
+          </a:p>
+          <a:p>
+            <a:pPr lvl="1"/>
+            <a:r>
+              <a:rPr lang="en-US" dirty="0"/>
+              <a:t>Sprint 2: none</a:t>
+            </a:r>
+          </a:p>
+          <a:p>
+            <a:pPr lvl="1"/>
+            <a:r>
+              <a:rPr lang="en-US" dirty="0"/>
+              <a:t>Sprint 3: </a:t>
+            </a:r>
+          </a:p>
+          <a:p>
+            <a:pPr lvl="2"/>
+            <a:r>
+              <a:rPr lang="en-US" dirty="0"/>
+              <a:t>DNF, PRINT, EXPORT and SWAP functions with specified number (in GUI) </a:t>
+            </a:r>
+          </a:p>
+          <a:p>
+            <a:pPr lvl="2"/>
+            <a:r>
+              <a:rPr lang="en-US" dirty="0"/>
+              <a:t>PRINT will either print current run or previous run and not a specified run number when using the GUI</a:t>
+            </a:r>
+          </a:p>
+          <a:p>
+            <a:pPr lvl="2"/>
+            <a:r>
+              <a:rPr lang="en-US" dirty="0"/>
+              <a:t>Separate thread handling for update display</a:t>
+            </a:r>
+          </a:p>
+          <a:p>
+            <a:pPr lvl="2"/>
+            <a:r>
+              <a:rPr lang="en-US" dirty="0"/>
+              <a:t>The RETURN function will return and display the updated racer’s queue</a:t>
+            </a:r>
+          </a:p>
+          <a:p>
+            <a:pPr lvl="2"/>
+            <a:r>
+              <a:rPr lang="en-US" dirty="0"/>
+              <a:t>The UP/DOWN/LEFT/RIGHT Arrow Buttons will cycle through executable commands</a:t>
+            </a:r>
+          </a:p>
+          <a:p>
+            <a:pPr lvl="1"/>
+            <a:r>
+              <a:rPr lang="en-US" dirty="0"/>
+              <a:t>Sprint4: completed project</a:t>
             </a:r>
           </a:p>
         </p:txBody>
@@ -8223,7 +8287,7 @@
     </p:spTree>
     <p:extLst>
       <p:ext uri="{BB962C8B-B14F-4D97-AF65-F5344CB8AC3E}">
-        <p14:creationId xmlns:p14="http://schemas.microsoft.com/office/powerpoint/2010/main" val="2753611735"/>
+        <p14:creationId xmlns:p14="http://schemas.microsoft.com/office/powerpoint/2010/main" val="1224257699"/>
       </p:ext>
     </p:extLst>
   </p:cSld>
@@ -8255,157 +8319,6 @@
           <p:cNvPr id="2" name="Title 1">
             <a:extLst>
               <a:ext uri="{FF2B5EF4-FFF2-40B4-BE49-F238E27FC236}">
-                <a16:creationId xmlns:a16="http://schemas.microsoft.com/office/drawing/2014/main" id="{9A054362-6713-415D-9DC9-381F3A40ADE9}"/>
-              </a:ext>
-            </a:extLst>
-          </p:cNvPr>
-          <p:cNvSpPr>
-            <a:spLocks noGrp="1"/>
-          </p:cNvSpPr>
-          <p:nvPr>
-            <p:ph type="title"/>
-          </p:nvPr>
-        </p:nvSpPr>
-        <p:spPr/>
-        <p:txBody>
-          <a:bodyPr/>
-          <a:lstStyle/>
-          <a:p>
-            <a:r>
-              <a:rPr lang="en-US" dirty="0"/>
-              <a:t>Iteration Plans</a:t>
-            </a:r>
-          </a:p>
-        </p:txBody>
-      </p:sp>
-      <p:sp>
-        <p:nvSpPr>
-          <p:cNvPr id="3" name="Content Placeholder 2">
-            <a:extLst>
-              <a:ext uri="{FF2B5EF4-FFF2-40B4-BE49-F238E27FC236}">
-                <a16:creationId xmlns:a16="http://schemas.microsoft.com/office/drawing/2014/main" id="{663C3BCE-A737-415F-9C7A-841A72747582}"/>
-              </a:ext>
-            </a:extLst>
-          </p:cNvPr>
-          <p:cNvSpPr>
-            <a:spLocks noGrp="1"/>
-          </p:cNvSpPr>
-          <p:nvPr>
-            <p:ph idx="1"/>
-          </p:nvPr>
-        </p:nvSpPr>
-        <p:spPr/>
-        <p:txBody>
-          <a:bodyPr>
-            <a:normAutofit/>
-          </a:bodyPr>
-          <a:lstStyle/>
-          <a:p>
-            <a:r>
-              <a:rPr lang="en-US" dirty="0"/>
-              <a:t>Backlogs</a:t>
-            </a:r>
-          </a:p>
-          <a:p>
-            <a:pPr lvl="1"/>
-            <a:r>
-              <a:rPr lang="en-US" dirty="0"/>
-              <a:t>Sprint 1: none</a:t>
-            </a:r>
-          </a:p>
-          <a:p>
-            <a:pPr lvl="1"/>
-            <a:r>
-              <a:rPr lang="en-US" dirty="0"/>
-              <a:t>Sprint 2: none</a:t>
-            </a:r>
-          </a:p>
-          <a:p>
-            <a:pPr lvl="1"/>
-            <a:r>
-              <a:rPr lang="en-US" dirty="0"/>
-              <a:t>Sprint 3: </a:t>
-            </a:r>
-          </a:p>
-          <a:p>
-            <a:pPr lvl="2"/>
-            <a:r>
-              <a:rPr lang="en-US" dirty="0"/>
-              <a:t>DNF, PRINT, EXPORT and SWAP functions with specified number (in GUI) </a:t>
-            </a:r>
-          </a:p>
-          <a:p>
-            <a:pPr lvl="2"/>
-            <a:r>
-              <a:rPr lang="en-US" dirty="0"/>
-              <a:t>PRINT will either print current run or previous run and not a specified run number when using the GUI</a:t>
-            </a:r>
-          </a:p>
-          <a:p>
-            <a:pPr lvl="2"/>
-            <a:r>
-              <a:rPr lang="en-US" dirty="0"/>
-              <a:t>Separate thread handling for update display</a:t>
-            </a:r>
-          </a:p>
-          <a:p>
-            <a:pPr lvl="2"/>
-            <a:r>
-              <a:rPr lang="en-US" dirty="0"/>
-              <a:t>The RETURN function will return and display the updated racer’s queue</a:t>
-            </a:r>
-          </a:p>
-          <a:p>
-            <a:pPr lvl="2"/>
-            <a:r>
-              <a:rPr lang="en-US" dirty="0"/>
-              <a:t>The UP/DOWN/LEFT/RIGHT Arrow Buttons will cycle through executable commands</a:t>
-            </a:r>
-          </a:p>
-          <a:p>
-            <a:pPr lvl="1"/>
-            <a:r>
-              <a:rPr lang="en-US" dirty="0"/>
-              <a:t>Sprint4: completed project</a:t>
-            </a:r>
-          </a:p>
-        </p:txBody>
-      </p:sp>
-    </p:spTree>
-    <p:extLst>
-      <p:ext uri="{BB962C8B-B14F-4D97-AF65-F5344CB8AC3E}">
-        <p14:creationId xmlns:p14="http://schemas.microsoft.com/office/powerpoint/2010/main" val="1224257699"/>
-      </p:ext>
-    </p:extLst>
-  </p:cSld>
-  <p:clrMapOvr>
-    <a:masterClrMapping/>
-  </p:clrMapOvr>
-</p:sld>
-</file>
-
-<file path=ppt/slides/slide8.xml><?xml version="1.0" encoding="utf-8"?>
-<p:sld xmlns:a="http://schemas.openxmlformats.org/drawingml/2006/main" xmlns:r="http://schemas.openxmlformats.org/officeDocument/2006/relationships" xmlns:p="http://schemas.openxmlformats.org/presentationml/2006/main">
-  <p:cSld>
-    <p:spTree>
-      <p:nvGrpSpPr>
-        <p:cNvPr id="1" name=""/>
-        <p:cNvGrpSpPr/>
-        <p:nvPr/>
-      </p:nvGrpSpPr>
-      <p:grpSpPr>
-        <a:xfrm>
-          <a:off x="0" y="0"/>
-          <a:ext cx="0" cy="0"/>
-          <a:chOff x="0" y="0"/>
-          <a:chExt cx="0" cy="0"/>
-        </a:xfrm>
-      </p:grpSpPr>
-      <p:sp>
-        <p:nvSpPr>
-          <p:cNvPr id="2" name="Title 1">
-            <a:extLst>
-              <a:ext uri="{FF2B5EF4-FFF2-40B4-BE49-F238E27FC236}">
                 <a16:creationId xmlns:a16="http://schemas.microsoft.com/office/drawing/2014/main" id="{F5255461-AE45-4953-9D1D-316B07722567}"/>
               </a:ext>
             </a:extLst>
@@ -8459,7 +8372,7 @@
             <a:pPr lvl="1"/>
             <a:r>
               <a:rPr lang="en-US" dirty="0"/>
-              <a:t>Riley – GUI and Simulator</a:t>
+              <a:t>Riley – GUI, Simulator, Documentation</a:t>
             </a:r>
           </a:p>
           <a:p>
@@ -8474,7 +8387,7 @@
             </a:r>
             <a:r>
               <a:rPr lang="en-US" dirty="0"/>
-              <a:t> and GUI</a:t>
+              <a:t>, GUI, Documentation</a:t>
             </a:r>
           </a:p>
           <a:p>
@@ -8489,7 +8402,7 @@
             </a:r>
             <a:r>
               <a:rPr lang="en-US" dirty="0"/>
-              <a:t> and Simulator</a:t>
+              <a:t>, Simulator</a:t>
             </a:r>
           </a:p>
           <a:p>
@@ -8504,7 +8417,7 @@
             </a:r>
             <a:r>
               <a:rPr lang="en-US" dirty="0"/>
-              <a:t> and GUI</a:t>
+              <a:t>, GUI, Server</a:t>
             </a:r>
           </a:p>
           <a:p>
@@ -8519,7 +8432,7 @@
             </a:r>
             <a:r>
               <a:rPr lang="en-US" dirty="0"/>
-              <a:t> and Testing</a:t>
+              <a:t>, Testing, Documentation</a:t>
             </a:r>
           </a:p>
           <a:p>
@@ -8543,7 +8456,7 @@
 </p:sld>
 </file>
 
-<file path=ppt/slides/slide9.xml><?xml version="1.0" encoding="utf-8"?>
+<file path=ppt/slides/slide8.xml><?xml version="1.0" encoding="utf-8"?>
 <p:sld xmlns:a="http://schemas.openxmlformats.org/drawingml/2006/main" xmlns:r="http://schemas.openxmlformats.org/officeDocument/2006/relationships" xmlns:p="http://schemas.openxmlformats.org/presentationml/2006/main">
   <p:cSld>
     <p:bg>
@@ -8660,7 +8573,7 @@
           <a:effectLst/>
           <a:extLst>
             <a:ext uri="{91240B29-F687-4f45-9708-019B960494DF}">
-              <a14:hiddenLine xmlns:a14="http://schemas.microsoft.com/office/drawing/2010/main" xmlns="" w="9525">
+              <a14:hiddenLine xmlns="" xmlns:a14="http://schemas.microsoft.com/office/drawing/2010/main" w="9525">
                 <a:solidFill>
                   <a:srgbClr val="000000"/>
                 </a:solidFill>
@@ -8977,7 +8890,7 @@
           <a:effectLst/>
           <a:extLst>
             <a:ext uri="{91240B29-F687-4f45-9708-019B960494DF}">
-              <a14:hiddenLine xmlns:a14="http://schemas.microsoft.com/office/drawing/2010/main" xmlns:p14="http://schemas.microsoft.com/office/powerpoint/2010/main" xmlns:a16="http://schemas.microsoft.com/office/drawing/2014/main" xmlns="" w="9525">
+              <a14:hiddenLine xmlns="" xmlns:a16="http://schemas.microsoft.com/office/drawing/2014/main" xmlns:p14="http://schemas.microsoft.com/office/powerpoint/2010/main" xmlns:a14="http://schemas.microsoft.com/office/drawing/2010/main" w="9525">
                 <a:solidFill>
                   <a:srgbClr val="000000"/>
                 </a:solidFill>

</xml_diff>